<commit_message>
agregados templates power point
</commit_message>
<xml_diff>
--- a/lacnic-ipv4-fase3-model/LACNIC_IPv4_F3_Report_v3.pptx
+++ b/lacnic-ipv4-fase3-model/LACNIC_IPv4_F3_Report_v3.pptx
@@ -14,7 +14,7 @@
     <p:sldId id="262" r:id="rId8"/>
     <p:sldId id="263" r:id="rId9"/>
   </p:sldIdLst>
-  <p:sldSz cx="9144000" cy="6858000" type="screen4x3"/>
+  <p:sldSz cx="9144000" cy="5143500" type="screen16x9"/>
   <p:notesSz cx="6858000" cy="9144000"/>
   <p:defaultTextStyle>
     <a:defPPr>
@@ -114,12 +114,12 @@
   <p:extLst>
     <p:ext uri="{EFAFB233-063F-42B5-8137-9DF3F51BA10A}">
       <p15:sldGuideLst xmlns:p15="http://schemas.microsoft.com/office/powerpoint/2012/main">
-        <p15:guide id="1" orient="horz" pos="2160">
+        <p15:guide id="1" orient="horz" pos="1620" userDrawn="1">
           <p15:clr>
             <a:srgbClr val="A4A3A4"/>
           </p15:clr>
         </p15:guide>
-        <p15:guide id="2" pos="2880">
+        <p15:guide id="2" pos="2880" userDrawn="1">
           <p15:clr>
             <a:srgbClr val="A4A3A4"/>
           </p15:clr>
@@ -133,6 +133,20 @@
 <file path=ppt/slideLayouts/slideLayout1.xml><?xml version="1.0" encoding="utf-8"?>
 <p:sldLayout xmlns:a="http://schemas.openxmlformats.org/drawingml/2006/main" xmlns:r="http://schemas.openxmlformats.org/officeDocument/2006/relationships" xmlns:p="http://schemas.openxmlformats.org/presentationml/2006/main" type="title" preserve="1">
   <p:cSld name="Title Slide">
+    <p:bg>
+      <p:bgPr>
+        <a:blipFill dpi="0" rotWithShape="1">
+          <a:blip r:embed="rId2">
+            <a:lum/>
+          </a:blip>
+          <a:srcRect/>
+          <a:stretch>
+            <a:fillRect/>
+          </a:stretch>
+        </a:blipFill>
+        <a:effectLst/>
+      </p:bgPr>
+    </p:bg>
     <p:spTree>
       <p:nvGrpSpPr>
         <p:cNvPr id="1" name=""/>
@@ -159,19 +173,26 @@
         </p:nvSpPr>
         <p:spPr>
           <a:xfrm>
-            <a:off x="685800" y="2130425"/>
-            <a:ext cx="7772400" cy="1470025"/>
+            <a:off x="685800" y="1597819"/>
+            <a:ext cx="7772400" cy="1102519"/>
           </a:xfrm>
         </p:spPr>
         <p:txBody>
           <a:bodyPr/>
-          <a:lstStyle/>
-          <a:p>
-            <a:r>
-              <a:rPr lang="en-US" smtClean="0"/>
+          <a:lstStyle>
+            <a:lvl1pPr>
+              <a:defRPr>
+                <a:solidFill>
+                  <a:schemeClr val="bg1"/>
+                </a:solidFill>
+              </a:defRPr>
+            </a:lvl1pPr>
+          </a:lstStyle>
+          <a:p>
+            <a:r>
+              <a:rPr lang="en-US" dirty="0"/>
               <a:t>Click to edit Master title style</a:t>
             </a:r>
-            <a:endParaRPr lang="en-US"/>
           </a:p>
         </p:txBody>
       </p:sp>
@@ -187,24 +208,24 @@
         </p:nvSpPr>
         <p:spPr>
           <a:xfrm>
-            <a:off x="1371600" y="3886200"/>
-            <a:ext cx="6400800" cy="1752600"/>
+            <a:off x="6626351" y="2880360"/>
+            <a:ext cx="2133600" cy="1238794"/>
           </a:xfrm>
         </p:spPr>
         <p:txBody>
           <a:bodyPr/>
           <a:lstStyle>
-            <a:lvl1pPr marL="0" indent="0" algn="ctr">
-              <a:buNone/>
-              <a:defRPr>
+            <a:lvl1pPr marL="0" indent="0" algn="r">
+              <a:buNone/>
+              <a:defRPr i="1">
                 <a:solidFill>
-                  <a:schemeClr val="tx1">
-                    <a:tint val="75000"/>
+                  <a:schemeClr val="bg1">
+                    <a:lumMod val="95000"/>
                   </a:schemeClr>
                 </a:solidFill>
               </a:defRPr>
             </a:lvl1pPr>
-            <a:lvl2pPr marL="457200" indent="0" algn="ctr">
+            <a:lvl2pPr marL="342900" indent="0" algn="ctr">
               <a:buNone/>
               <a:defRPr>
                 <a:solidFill>
@@ -214,7 +235,7 @@
                 </a:solidFill>
               </a:defRPr>
             </a:lvl2pPr>
-            <a:lvl3pPr marL="914400" indent="0" algn="ctr">
+            <a:lvl3pPr marL="685800" indent="0" algn="ctr">
               <a:buNone/>
               <a:defRPr>
                 <a:solidFill>
@@ -224,7 +245,7 @@
                 </a:solidFill>
               </a:defRPr>
             </a:lvl3pPr>
-            <a:lvl4pPr marL="1371600" indent="0" algn="ctr">
+            <a:lvl4pPr marL="1028700" indent="0" algn="ctr">
               <a:buNone/>
               <a:defRPr>
                 <a:solidFill>
@@ -234,7 +255,7 @@
                 </a:solidFill>
               </a:defRPr>
             </a:lvl4pPr>
-            <a:lvl5pPr marL="1828800" indent="0" algn="ctr">
+            <a:lvl5pPr marL="1371600" indent="0" algn="ctr">
               <a:buNone/>
               <a:defRPr>
                 <a:solidFill>
@@ -244,7 +265,7 @@
                 </a:solidFill>
               </a:defRPr>
             </a:lvl5pPr>
-            <a:lvl6pPr marL="2286000" indent="0" algn="ctr">
+            <a:lvl6pPr marL="1714500" indent="0" algn="ctr">
               <a:buNone/>
               <a:defRPr>
                 <a:solidFill>
@@ -254,7 +275,7 @@
                 </a:solidFill>
               </a:defRPr>
             </a:lvl6pPr>
-            <a:lvl7pPr marL="2743200" indent="0" algn="ctr">
+            <a:lvl7pPr marL="2057400" indent="0" algn="ctr">
               <a:buNone/>
               <a:defRPr>
                 <a:solidFill>
@@ -264,7 +285,7 @@
                 </a:solidFill>
               </a:defRPr>
             </a:lvl7pPr>
-            <a:lvl8pPr marL="3200400" indent="0" algn="ctr">
+            <a:lvl8pPr marL="2400300" indent="0" algn="ctr">
               <a:buNone/>
               <a:defRPr>
                 <a:solidFill>
@@ -274,7 +295,7 @@
                 </a:solidFill>
               </a:defRPr>
             </a:lvl8pPr>
-            <a:lvl9pPr marL="3657600" indent="0" algn="ctr">
+            <a:lvl9pPr marL="2743200" indent="0" algn="ctr">
               <a:buNone/>
               <a:defRPr>
                 <a:solidFill>
@@ -287,10 +308,9 @@
           </a:lstStyle>
           <a:p>
             <a:r>
-              <a:rPr lang="en-US" smtClean="0"/>
+              <a:rPr lang="en-US" dirty="0"/>
               <a:t>Click to edit Master subtitle style</a:t>
             </a:r>
-            <a:endParaRPr lang="en-US"/>
           </a:p>
         </p:txBody>
       </p:sp>
@@ -311,7 +331,7 @@
           <a:p>
             <a:fld id="{241EB5C9-1307-BA42-ABA2-0BC069CD8E7F}" type="datetimeFigureOut">
               <a:rPr lang="en-US" smtClean="0"/>
-              <a:t>4/5/2019</a:t>
+              <a:t>2/20/20</a:t>
             </a:fld>
             <a:endParaRPr lang="en-US"/>
           </a:p>
@@ -405,10 +425,9 @@
           <a:lstStyle/>
           <a:p>
             <a:r>
-              <a:rPr lang="en-US" smtClean="0"/>
+              <a:rPr lang="en-US"/>
               <a:t>Click to edit Master title style</a:t>
             </a:r>
-            <a:endParaRPr lang="en-US"/>
           </a:p>
         </p:txBody>
       </p:sp>
@@ -429,38 +448,37 @@
           <a:p>
             <a:pPr lvl="0"/>
             <a:r>
-              <a:rPr lang="en-US" smtClean="0"/>
+              <a:rPr lang="en-US"/>
               <a:t>Click to edit Master text styles</a:t>
             </a:r>
           </a:p>
           <a:p>
             <a:pPr lvl="1"/>
             <a:r>
-              <a:rPr lang="en-US" smtClean="0"/>
+              <a:rPr lang="en-US"/>
               <a:t>Second level</a:t>
             </a:r>
           </a:p>
           <a:p>
             <a:pPr lvl="2"/>
             <a:r>
-              <a:rPr lang="en-US" smtClean="0"/>
+              <a:rPr lang="en-US"/>
               <a:t>Third level</a:t>
             </a:r>
           </a:p>
           <a:p>
             <a:pPr lvl="3"/>
             <a:r>
-              <a:rPr lang="en-US" smtClean="0"/>
+              <a:rPr lang="en-US"/>
               <a:t>Fourth level</a:t>
             </a:r>
           </a:p>
           <a:p>
             <a:pPr lvl="4"/>
             <a:r>
-              <a:rPr lang="en-US" smtClean="0"/>
+              <a:rPr lang="en-US"/>
               <a:t>Fifth level</a:t>
             </a:r>
-            <a:endParaRPr lang="en-US"/>
           </a:p>
         </p:txBody>
       </p:sp>
@@ -481,7 +499,7 @@
           <a:p>
             <a:fld id="{241EB5C9-1307-BA42-ABA2-0BC069CD8E7F}" type="datetimeFigureOut">
               <a:rPr lang="en-US" smtClean="0"/>
-              <a:t>4/5/2019</a:t>
+              <a:t>2/20/20</a:t>
             </a:fld>
             <a:endParaRPr lang="en-US"/>
           </a:p>
@@ -571,8 +589,8 @@
         </p:nvSpPr>
         <p:spPr>
           <a:xfrm>
-            <a:off x="6629400" y="274638"/>
-            <a:ext cx="2057400" cy="5851525"/>
+            <a:off x="6629400" y="205979"/>
+            <a:ext cx="2057400" cy="4388644"/>
           </a:xfrm>
         </p:spPr>
         <p:txBody>
@@ -580,10 +598,9 @@
           <a:lstStyle/>
           <a:p>
             <a:r>
-              <a:rPr lang="en-US" smtClean="0"/>
+              <a:rPr lang="en-US"/>
               <a:t>Click to edit Master title style</a:t>
             </a:r>
-            <a:endParaRPr lang="en-US"/>
           </a:p>
         </p:txBody>
       </p:sp>
@@ -599,8 +616,8 @@
         </p:nvSpPr>
         <p:spPr>
           <a:xfrm>
-            <a:off x="457200" y="274638"/>
-            <a:ext cx="6019800" cy="5851525"/>
+            <a:off x="457200" y="205979"/>
+            <a:ext cx="6019800" cy="4388644"/>
           </a:xfrm>
         </p:spPr>
         <p:txBody>
@@ -609,38 +626,37 @@
           <a:p>
             <a:pPr lvl="0"/>
             <a:r>
-              <a:rPr lang="en-US" smtClean="0"/>
+              <a:rPr lang="en-US"/>
               <a:t>Click to edit Master text styles</a:t>
             </a:r>
           </a:p>
           <a:p>
             <a:pPr lvl="1"/>
             <a:r>
-              <a:rPr lang="en-US" smtClean="0"/>
+              <a:rPr lang="en-US"/>
               <a:t>Second level</a:t>
             </a:r>
           </a:p>
           <a:p>
             <a:pPr lvl="2"/>
             <a:r>
-              <a:rPr lang="en-US" smtClean="0"/>
+              <a:rPr lang="en-US"/>
               <a:t>Third level</a:t>
             </a:r>
           </a:p>
           <a:p>
             <a:pPr lvl="3"/>
             <a:r>
-              <a:rPr lang="en-US" smtClean="0"/>
+              <a:rPr lang="en-US"/>
               <a:t>Fourth level</a:t>
             </a:r>
           </a:p>
           <a:p>
             <a:pPr lvl="4"/>
             <a:r>
-              <a:rPr lang="en-US" smtClean="0"/>
+              <a:rPr lang="en-US"/>
               <a:t>Fifth level</a:t>
             </a:r>
-            <a:endParaRPr lang="en-US"/>
           </a:p>
         </p:txBody>
       </p:sp>
@@ -661,7 +677,7 @@
           <a:p>
             <a:fld id="{241EB5C9-1307-BA42-ABA2-0BC069CD8E7F}" type="datetimeFigureOut">
               <a:rPr lang="en-US" smtClean="0"/>
-              <a:t>4/5/2019</a:t>
+              <a:t>2/20/20</a:t>
             </a:fld>
             <a:endParaRPr lang="en-US"/>
           </a:p>
@@ -755,10 +771,9 @@
           <a:lstStyle/>
           <a:p>
             <a:r>
-              <a:rPr lang="en-US" smtClean="0"/>
+              <a:rPr lang="en-US"/>
               <a:t>Click to edit Master title style</a:t>
             </a:r>
-            <a:endParaRPr lang="en-US"/>
           </a:p>
         </p:txBody>
       </p:sp>
@@ -779,61 +794,37 @@
           <a:p>
             <a:pPr lvl="0"/>
             <a:r>
-              <a:rPr lang="en-US" smtClean="0"/>
+              <a:rPr lang="en-US"/>
               <a:t>Click to edit Master text styles</a:t>
             </a:r>
           </a:p>
           <a:p>
             <a:pPr lvl="1"/>
             <a:r>
-              <a:rPr lang="en-US" smtClean="0"/>
+              <a:rPr lang="en-US"/>
               <a:t>Second level</a:t>
             </a:r>
           </a:p>
           <a:p>
             <a:pPr lvl="2"/>
             <a:r>
-              <a:rPr lang="en-US" smtClean="0"/>
+              <a:rPr lang="en-US"/>
               <a:t>Third level</a:t>
             </a:r>
           </a:p>
           <a:p>
             <a:pPr lvl="3"/>
             <a:r>
-              <a:rPr lang="en-US" smtClean="0"/>
+              <a:rPr lang="en-US"/>
               <a:t>Fourth level</a:t>
             </a:r>
           </a:p>
           <a:p>
             <a:pPr lvl="4"/>
             <a:r>
-              <a:rPr lang="en-US" smtClean="0"/>
+              <a:rPr lang="en-US"/>
               <a:t>Fifth level</a:t>
             </a:r>
-            <a:endParaRPr lang="en-US"/>
-          </a:p>
-        </p:txBody>
-      </p:sp>
-      <p:sp>
-        <p:nvSpPr>
-          <p:cNvPr id="4" name="Date Placeholder 3"/>
-          <p:cNvSpPr>
-            <a:spLocks noGrp="1"/>
-          </p:cNvSpPr>
-          <p:nvPr>
-            <p:ph type="dt" sz="half" idx="10"/>
-          </p:nvPr>
-        </p:nvSpPr>
-        <p:spPr/>
-        <p:txBody>
-          <a:bodyPr/>
-          <a:lstStyle/>
-          <a:p>
-            <a:fld id="{241EB5C9-1307-BA42-ABA2-0BC069CD8E7F}" type="datetimeFigureOut">
-              <a:rPr lang="en-US" smtClean="0"/>
-              <a:t>4/5/2019</a:t>
-            </a:fld>
-            <a:endParaRPr lang="en-US"/>
           </a:p>
         </p:txBody>
       </p:sp>
@@ -852,7 +843,22 @@
           <a:bodyPr/>
           <a:lstStyle/>
           <a:p>
-            <a:endParaRPr lang="en-US"/>
+            <a:r>
+              <a:rPr lang="en-US" dirty="0" err="1"/>
+              <a:t>Fase</a:t>
+            </a:r>
+            <a:r>
+              <a:rPr lang="en-US" dirty="0"/>
+              <a:t> 3 – </a:t>
+            </a:r>
+            <a:r>
+              <a:rPr lang="en-US" dirty="0" err="1"/>
+              <a:t>Agotamiento</a:t>
+            </a:r>
+            <a:r>
+              <a:rPr lang="en-US" dirty="0"/>
+              <a:t> de IPv4</a:t>
+            </a:r>
           </a:p>
         </p:txBody>
       </p:sp>
@@ -875,10 +881,40 @@
               <a:rPr lang="en-US" smtClean="0"/>
               <a:t>‹#›</a:t>
             </a:fld>
-            <a:endParaRPr lang="en-US"/>
-          </a:p>
-        </p:txBody>
-      </p:sp>
+            <a:endParaRPr lang="en-US" dirty="0"/>
+          </a:p>
+        </p:txBody>
+      </p:sp>
+      <p:pic>
+        <p:nvPicPr>
+          <p:cNvPr id="8" name="Picture 7" descr="A close up of a logo&#10;&#10;Description automatically generated">
+            <a:extLst>
+              <a:ext uri="{FF2B5EF4-FFF2-40B4-BE49-F238E27FC236}">
+                <a16:creationId xmlns:a16="http://schemas.microsoft.com/office/drawing/2014/main" id="{BE98634C-9424-C34A-B44C-E6A561AC649A}"/>
+              </a:ext>
+            </a:extLst>
+          </p:cNvPr>
+          <p:cNvPicPr>
+            <a:picLocks noChangeAspect="1"/>
+          </p:cNvPicPr>
+          <p:nvPr userDrawn="1"/>
+        </p:nvPicPr>
+        <p:blipFill>
+          <a:blip r:embed="rId2"/>
+          <a:stretch>
+            <a:fillRect/>
+          </a:stretch>
+        </p:blipFill>
+        <p:spPr>
+          <a:xfrm>
+            <a:off x="282121" y="4628560"/>
+            <a:ext cx="1006748" cy="459775"/>
+          </a:xfrm>
+          <a:prstGeom prst="rect">
+            <a:avLst/>
+          </a:prstGeom>
+        </p:spPr>
+      </p:pic>
     </p:spTree>
     <p:extLst>
       <p:ext uri="{BB962C8B-B14F-4D97-AF65-F5344CB8AC3E}">
@@ -921,23 +957,22 @@
         </p:nvSpPr>
         <p:spPr>
           <a:xfrm>
-            <a:off x="722313" y="4406900"/>
-            <a:ext cx="7772400" cy="1362075"/>
+            <a:off x="722313" y="3305176"/>
+            <a:ext cx="7772400" cy="1021556"/>
           </a:xfrm>
         </p:spPr>
         <p:txBody>
           <a:bodyPr anchor="t"/>
           <a:lstStyle>
             <a:lvl1pPr algn="l">
-              <a:defRPr sz="4000" b="1" cap="all"/>
+              <a:defRPr sz="3000" b="1" cap="all"/>
             </a:lvl1pPr>
           </a:lstStyle>
           <a:p>
             <a:r>
-              <a:rPr lang="en-US" smtClean="0"/>
+              <a:rPr lang="en-US"/>
               <a:t>Click to edit Master title style</a:t>
             </a:r>
-            <a:endParaRPr lang="en-US"/>
           </a:p>
         </p:txBody>
       </p:sp>
@@ -953,8 +988,8 @@
         </p:nvSpPr>
         <p:spPr>
           <a:xfrm>
-            <a:off x="722313" y="2906713"/>
-            <a:ext cx="7772400" cy="1500187"/>
+            <a:off x="722313" y="2180035"/>
+            <a:ext cx="7772400" cy="1125140"/>
           </a:xfrm>
         </p:spPr>
         <p:txBody>
@@ -962,7 +997,7 @@
           <a:lstStyle>
             <a:lvl1pPr marL="0" indent="0">
               <a:buNone/>
-              <a:defRPr sz="2000">
+              <a:defRPr sz="1500">
                 <a:solidFill>
                   <a:schemeClr val="tx1">
                     <a:tint val="75000"/>
@@ -970,9 +1005,9 @@
                 </a:solidFill>
               </a:defRPr>
             </a:lvl1pPr>
-            <a:lvl2pPr marL="457200" indent="0">
-              <a:buNone/>
-              <a:defRPr sz="1800">
+            <a:lvl2pPr marL="342900" indent="0">
+              <a:buNone/>
+              <a:defRPr sz="1350">
                 <a:solidFill>
                   <a:schemeClr val="tx1">
                     <a:tint val="75000"/>
@@ -980,9 +1015,9 @@
                 </a:solidFill>
               </a:defRPr>
             </a:lvl2pPr>
-            <a:lvl3pPr marL="914400" indent="0">
-              <a:buNone/>
-              <a:defRPr sz="1600">
+            <a:lvl3pPr marL="685800" indent="0">
+              <a:buNone/>
+              <a:defRPr sz="1200">
                 <a:solidFill>
                   <a:schemeClr val="tx1">
                     <a:tint val="75000"/>
@@ -990,9 +1025,9 @@
                 </a:solidFill>
               </a:defRPr>
             </a:lvl3pPr>
-            <a:lvl4pPr marL="1371600" indent="0">
-              <a:buNone/>
-              <a:defRPr sz="1400">
+            <a:lvl4pPr marL="1028700" indent="0">
+              <a:buNone/>
+              <a:defRPr sz="1050">
                 <a:solidFill>
                   <a:schemeClr val="tx1">
                     <a:tint val="75000"/>
@@ -1000,9 +1035,9 @@
                 </a:solidFill>
               </a:defRPr>
             </a:lvl4pPr>
-            <a:lvl5pPr marL="1828800" indent="0">
-              <a:buNone/>
-              <a:defRPr sz="1400">
+            <a:lvl5pPr marL="1371600" indent="0">
+              <a:buNone/>
+              <a:defRPr sz="1050">
                 <a:solidFill>
                   <a:schemeClr val="tx1">
                     <a:tint val="75000"/>
@@ -1010,9 +1045,9 @@
                 </a:solidFill>
               </a:defRPr>
             </a:lvl5pPr>
-            <a:lvl6pPr marL="2286000" indent="0">
-              <a:buNone/>
-              <a:defRPr sz="1400">
+            <a:lvl6pPr marL="1714500" indent="0">
+              <a:buNone/>
+              <a:defRPr sz="1050">
                 <a:solidFill>
                   <a:schemeClr val="tx1">
                     <a:tint val="75000"/>
@@ -1020,9 +1055,9 @@
                 </a:solidFill>
               </a:defRPr>
             </a:lvl6pPr>
-            <a:lvl7pPr marL="2743200" indent="0">
-              <a:buNone/>
-              <a:defRPr sz="1400">
+            <a:lvl7pPr marL="2057400" indent="0">
+              <a:buNone/>
+              <a:defRPr sz="1050">
                 <a:solidFill>
                   <a:schemeClr val="tx1">
                     <a:tint val="75000"/>
@@ -1030,9 +1065,9 @@
                 </a:solidFill>
               </a:defRPr>
             </a:lvl7pPr>
-            <a:lvl8pPr marL="3200400" indent="0">
-              <a:buNone/>
-              <a:defRPr sz="1400">
+            <a:lvl8pPr marL="2400300" indent="0">
+              <a:buNone/>
+              <a:defRPr sz="1050">
                 <a:solidFill>
                   <a:schemeClr val="tx1">
                     <a:tint val="75000"/>
@@ -1040,9 +1075,9 @@
                 </a:solidFill>
               </a:defRPr>
             </a:lvl8pPr>
-            <a:lvl9pPr marL="3657600" indent="0">
-              <a:buNone/>
-              <a:defRPr sz="1400">
+            <a:lvl9pPr marL="2743200" indent="0">
+              <a:buNone/>
+              <a:defRPr sz="1050">
                 <a:solidFill>
                   <a:schemeClr val="tx1">
                     <a:tint val="75000"/>
@@ -1054,7 +1089,7 @@
           <a:p>
             <a:pPr lvl="0"/>
             <a:r>
-              <a:rPr lang="en-US" smtClean="0"/>
+              <a:rPr lang="en-US"/>
               <a:t>Click to edit Master text styles</a:t>
             </a:r>
           </a:p>
@@ -1077,7 +1112,7 @@
           <a:p>
             <a:fld id="{241EB5C9-1307-BA42-ABA2-0BC069CD8E7F}" type="datetimeFigureOut">
               <a:rPr lang="en-US" smtClean="0"/>
-              <a:t>4/5/2019</a:t>
+              <a:t>2/20/20</a:t>
             </a:fld>
             <a:endParaRPr lang="en-US"/>
           </a:p>
@@ -1171,10 +1206,9 @@
           <a:lstStyle/>
           <a:p>
             <a:r>
-              <a:rPr lang="en-US" smtClean="0"/>
+              <a:rPr lang="en-US"/>
               <a:t>Click to edit Master title style</a:t>
             </a:r>
-            <a:endParaRPr lang="en-US"/>
           </a:p>
         </p:txBody>
       </p:sp>
@@ -1190,76 +1224,75 @@
         </p:nvSpPr>
         <p:spPr>
           <a:xfrm>
-            <a:off x="457200" y="1600200"/>
-            <a:ext cx="4038600" cy="4525963"/>
+            <a:off x="457200" y="1200151"/>
+            <a:ext cx="4038600" cy="3394472"/>
           </a:xfrm>
         </p:spPr>
         <p:txBody>
           <a:bodyPr/>
           <a:lstStyle>
             <a:lvl1pPr>
-              <a:defRPr sz="2800"/>
+              <a:defRPr sz="2100"/>
             </a:lvl1pPr>
             <a:lvl2pPr>
-              <a:defRPr sz="2400"/>
+              <a:defRPr sz="1800"/>
             </a:lvl2pPr>
             <a:lvl3pPr>
-              <a:defRPr sz="2000"/>
+              <a:defRPr sz="1500"/>
             </a:lvl3pPr>
             <a:lvl4pPr>
-              <a:defRPr sz="1800"/>
+              <a:defRPr sz="1350"/>
             </a:lvl4pPr>
             <a:lvl5pPr>
-              <a:defRPr sz="1800"/>
+              <a:defRPr sz="1350"/>
             </a:lvl5pPr>
             <a:lvl6pPr>
-              <a:defRPr sz="1800"/>
+              <a:defRPr sz="1350"/>
             </a:lvl6pPr>
             <a:lvl7pPr>
-              <a:defRPr sz="1800"/>
+              <a:defRPr sz="1350"/>
             </a:lvl7pPr>
             <a:lvl8pPr>
-              <a:defRPr sz="1800"/>
+              <a:defRPr sz="1350"/>
             </a:lvl8pPr>
             <a:lvl9pPr>
-              <a:defRPr sz="1800"/>
+              <a:defRPr sz="1350"/>
             </a:lvl9pPr>
           </a:lstStyle>
           <a:p>
             <a:pPr lvl="0"/>
             <a:r>
-              <a:rPr lang="en-US" smtClean="0"/>
+              <a:rPr lang="en-US"/>
               <a:t>Click to edit Master text styles</a:t>
             </a:r>
           </a:p>
           <a:p>
             <a:pPr lvl="1"/>
             <a:r>
-              <a:rPr lang="en-US" smtClean="0"/>
+              <a:rPr lang="en-US"/>
               <a:t>Second level</a:t>
             </a:r>
           </a:p>
           <a:p>
             <a:pPr lvl="2"/>
             <a:r>
-              <a:rPr lang="en-US" smtClean="0"/>
+              <a:rPr lang="en-US"/>
               <a:t>Third level</a:t>
             </a:r>
           </a:p>
           <a:p>
             <a:pPr lvl="3"/>
             <a:r>
-              <a:rPr lang="en-US" smtClean="0"/>
+              <a:rPr lang="en-US"/>
               <a:t>Fourth level</a:t>
             </a:r>
           </a:p>
           <a:p>
             <a:pPr lvl="4"/>
             <a:r>
-              <a:rPr lang="en-US" smtClean="0"/>
+              <a:rPr lang="en-US"/>
               <a:t>Fifth level</a:t>
             </a:r>
-            <a:endParaRPr lang="en-US"/>
           </a:p>
         </p:txBody>
       </p:sp>
@@ -1275,76 +1308,75 @@
         </p:nvSpPr>
         <p:spPr>
           <a:xfrm>
-            <a:off x="4648200" y="1600200"/>
-            <a:ext cx="4038600" cy="4525963"/>
+            <a:off x="4648200" y="1200151"/>
+            <a:ext cx="4038600" cy="3394472"/>
           </a:xfrm>
         </p:spPr>
         <p:txBody>
           <a:bodyPr/>
           <a:lstStyle>
             <a:lvl1pPr>
-              <a:defRPr sz="2800"/>
+              <a:defRPr sz="2100"/>
             </a:lvl1pPr>
             <a:lvl2pPr>
-              <a:defRPr sz="2400"/>
+              <a:defRPr sz="1800"/>
             </a:lvl2pPr>
             <a:lvl3pPr>
-              <a:defRPr sz="2000"/>
+              <a:defRPr sz="1500"/>
             </a:lvl3pPr>
             <a:lvl4pPr>
-              <a:defRPr sz="1800"/>
+              <a:defRPr sz="1350"/>
             </a:lvl4pPr>
             <a:lvl5pPr>
-              <a:defRPr sz="1800"/>
+              <a:defRPr sz="1350"/>
             </a:lvl5pPr>
             <a:lvl6pPr>
-              <a:defRPr sz="1800"/>
+              <a:defRPr sz="1350"/>
             </a:lvl6pPr>
             <a:lvl7pPr>
-              <a:defRPr sz="1800"/>
+              <a:defRPr sz="1350"/>
             </a:lvl7pPr>
             <a:lvl8pPr>
-              <a:defRPr sz="1800"/>
+              <a:defRPr sz="1350"/>
             </a:lvl8pPr>
             <a:lvl9pPr>
-              <a:defRPr sz="1800"/>
+              <a:defRPr sz="1350"/>
             </a:lvl9pPr>
           </a:lstStyle>
           <a:p>
             <a:pPr lvl="0"/>
             <a:r>
-              <a:rPr lang="en-US" smtClean="0"/>
+              <a:rPr lang="en-US"/>
               <a:t>Click to edit Master text styles</a:t>
             </a:r>
           </a:p>
           <a:p>
             <a:pPr lvl="1"/>
             <a:r>
-              <a:rPr lang="en-US" smtClean="0"/>
+              <a:rPr lang="en-US"/>
               <a:t>Second level</a:t>
             </a:r>
           </a:p>
           <a:p>
             <a:pPr lvl="2"/>
             <a:r>
-              <a:rPr lang="en-US" smtClean="0"/>
+              <a:rPr lang="en-US"/>
               <a:t>Third level</a:t>
             </a:r>
           </a:p>
           <a:p>
             <a:pPr lvl="3"/>
             <a:r>
-              <a:rPr lang="en-US" smtClean="0"/>
+              <a:rPr lang="en-US"/>
               <a:t>Fourth level</a:t>
             </a:r>
           </a:p>
           <a:p>
             <a:pPr lvl="4"/>
             <a:r>
-              <a:rPr lang="en-US" smtClean="0"/>
+              <a:rPr lang="en-US"/>
               <a:t>Fifth level</a:t>
             </a:r>
-            <a:endParaRPr lang="en-US"/>
           </a:p>
         </p:txBody>
       </p:sp>
@@ -1365,7 +1397,7 @@
           <a:p>
             <a:fld id="{241EB5C9-1307-BA42-ABA2-0BC069CD8E7F}" type="datetimeFigureOut">
               <a:rPr lang="en-US" smtClean="0"/>
-              <a:t>4/5/2019</a:t>
+              <a:t>2/20/20</a:t>
             </a:fld>
             <a:endParaRPr lang="en-US"/>
           </a:p>
@@ -1463,10 +1495,9 @@
           </a:lstStyle>
           <a:p>
             <a:r>
-              <a:rPr lang="en-US" smtClean="0"/>
+              <a:rPr lang="en-US"/>
               <a:t>Click to edit Master title style</a:t>
             </a:r>
-            <a:endParaRPr lang="en-US"/>
           </a:p>
         </p:txBody>
       </p:sp>
@@ -1482,8 +1513,8 @@
         </p:nvSpPr>
         <p:spPr>
           <a:xfrm>
-            <a:off x="457200" y="1535113"/>
-            <a:ext cx="4040188" cy="639762"/>
+            <a:off x="457200" y="1151335"/>
+            <a:ext cx="4040188" cy="479822"/>
           </a:xfrm>
         </p:spPr>
         <p:txBody>
@@ -1491,45 +1522,45 @@
           <a:lstStyle>
             <a:lvl1pPr marL="0" indent="0">
               <a:buNone/>
-              <a:defRPr sz="2400" b="1"/>
+              <a:defRPr sz="1800" b="1"/>
             </a:lvl1pPr>
-            <a:lvl2pPr marL="457200" indent="0">
-              <a:buNone/>
-              <a:defRPr sz="2000" b="1"/>
+            <a:lvl2pPr marL="342900" indent="0">
+              <a:buNone/>
+              <a:defRPr sz="1500" b="1"/>
             </a:lvl2pPr>
-            <a:lvl3pPr marL="914400" indent="0">
-              <a:buNone/>
-              <a:defRPr sz="1800" b="1"/>
+            <a:lvl3pPr marL="685800" indent="0">
+              <a:buNone/>
+              <a:defRPr sz="1350" b="1"/>
             </a:lvl3pPr>
-            <a:lvl4pPr marL="1371600" indent="0">
-              <a:buNone/>
-              <a:defRPr sz="1600" b="1"/>
+            <a:lvl4pPr marL="1028700" indent="0">
+              <a:buNone/>
+              <a:defRPr sz="1200" b="1"/>
             </a:lvl4pPr>
-            <a:lvl5pPr marL="1828800" indent="0">
-              <a:buNone/>
-              <a:defRPr sz="1600" b="1"/>
+            <a:lvl5pPr marL="1371600" indent="0">
+              <a:buNone/>
+              <a:defRPr sz="1200" b="1"/>
             </a:lvl5pPr>
-            <a:lvl6pPr marL="2286000" indent="0">
-              <a:buNone/>
-              <a:defRPr sz="1600" b="1"/>
+            <a:lvl6pPr marL="1714500" indent="0">
+              <a:buNone/>
+              <a:defRPr sz="1200" b="1"/>
             </a:lvl6pPr>
-            <a:lvl7pPr marL="2743200" indent="0">
-              <a:buNone/>
-              <a:defRPr sz="1600" b="1"/>
+            <a:lvl7pPr marL="2057400" indent="0">
+              <a:buNone/>
+              <a:defRPr sz="1200" b="1"/>
             </a:lvl7pPr>
-            <a:lvl8pPr marL="3200400" indent="0">
-              <a:buNone/>
-              <a:defRPr sz="1600" b="1"/>
+            <a:lvl8pPr marL="2400300" indent="0">
+              <a:buNone/>
+              <a:defRPr sz="1200" b="1"/>
             </a:lvl8pPr>
-            <a:lvl9pPr marL="3657600" indent="0">
-              <a:buNone/>
-              <a:defRPr sz="1600" b="1"/>
+            <a:lvl9pPr marL="2743200" indent="0">
+              <a:buNone/>
+              <a:defRPr sz="1200" b="1"/>
             </a:lvl9pPr>
           </a:lstStyle>
           <a:p>
             <a:pPr lvl="0"/>
             <a:r>
-              <a:rPr lang="en-US" smtClean="0"/>
+              <a:rPr lang="en-US"/>
               <a:t>Click to edit Master text styles</a:t>
             </a:r>
           </a:p>
@@ -1547,76 +1578,75 @@
         </p:nvSpPr>
         <p:spPr>
           <a:xfrm>
-            <a:off x="457200" y="2174875"/>
-            <a:ext cx="4040188" cy="3951288"/>
+            <a:off x="457200" y="1631156"/>
+            <a:ext cx="4040188" cy="2963466"/>
           </a:xfrm>
         </p:spPr>
         <p:txBody>
           <a:bodyPr/>
           <a:lstStyle>
             <a:lvl1pPr>
-              <a:defRPr sz="2400"/>
+              <a:defRPr sz="1800"/>
             </a:lvl1pPr>
             <a:lvl2pPr>
-              <a:defRPr sz="2000"/>
+              <a:defRPr sz="1500"/>
             </a:lvl2pPr>
             <a:lvl3pPr>
-              <a:defRPr sz="1800"/>
+              <a:defRPr sz="1350"/>
             </a:lvl3pPr>
             <a:lvl4pPr>
-              <a:defRPr sz="1600"/>
+              <a:defRPr sz="1200"/>
             </a:lvl4pPr>
             <a:lvl5pPr>
-              <a:defRPr sz="1600"/>
+              <a:defRPr sz="1200"/>
             </a:lvl5pPr>
             <a:lvl6pPr>
-              <a:defRPr sz="1600"/>
+              <a:defRPr sz="1200"/>
             </a:lvl6pPr>
             <a:lvl7pPr>
-              <a:defRPr sz="1600"/>
+              <a:defRPr sz="1200"/>
             </a:lvl7pPr>
             <a:lvl8pPr>
-              <a:defRPr sz="1600"/>
+              <a:defRPr sz="1200"/>
             </a:lvl8pPr>
             <a:lvl9pPr>
-              <a:defRPr sz="1600"/>
+              <a:defRPr sz="1200"/>
             </a:lvl9pPr>
           </a:lstStyle>
           <a:p>
             <a:pPr lvl="0"/>
             <a:r>
-              <a:rPr lang="en-US" smtClean="0"/>
+              <a:rPr lang="en-US"/>
               <a:t>Click to edit Master text styles</a:t>
             </a:r>
           </a:p>
           <a:p>
             <a:pPr lvl="1"/>
             <a:r>
-              <a:rPr lang="en-US" smtClean="0"/>
+              <a:rPr lang="en-US"/>
               <a:t>Second level</a:t>
             </a:r>
           </a:p>
           <a:p>
             <a:pPr lvl="2"/>
             <a:r>
-              <a:rPr lang="en-US" smtClean="0"/>
+              <a:rPr lang="en-US"/>
               <a:t>Third level</a:t>
             </a:r>
           </a:p>
           <a:p>
             <a:pPr lvl="3"/>
             <a:r>
-              <a:rPr lang="en-US" smtClean="0"/>
+              <a:rPr lang="en-US"/>
               <a:t>Fourth level</a:t>
             </a:r>
           </a:p>
           <a:p>
             <a:pPr lvl="4"/>
             <a:r>
-              <a:rPr lang="en-US" smtClean="0"/>
+              <a:rPr lang="en-US"/>
               <a:t>Fifth level</a:t>
             </a:r>
-            <a:endParaRPr lang="en-US"/>
           </a:p>
         </p:txBody>
       </p:sp>
@@ -1632,8 +1662,8 @@
         </p:nvSpPr>
         <p:spPr>
           <a:xfrm>
-            <a:off x="4645025" y="1535113"/>
-            <a:ext cx="4041775" cy="639762"/>
+            <a:off x="4645026" y="1151335"/>
+            <a:ext cx="4041775" cy="479822"/>
           </a:xfrm>
         </p:spPr>
         <p:txBody>
@@ -1641,45 +1671,45 @@
           <a:lstStyle>
             <a:lvl1pPr marL="0" indent="0">
               <a:buNone/>
-              <a:defRPr sz="2400" b="1"/>
+              <a:defRPr sz="1800" b="1"/>
             </a:lvl1pPr>
-            <a:lvl2pPr marL="457200" indent="0">
-              <a:buNone/>
-              <a:defRPr sz="2000" b="1"/>
+            <a:lvl2pPr marL="342900" indent="0">
+              <a:buNone/>
+              <a:defRPr sz="1500" b="1"/>
             </a:lvl2pPr>
-            <a:lvl3pPr marL="914400" indent="0">
-              <a:buNone/>
-              <a:defRPr sz="1800" b="1"/>
+            <a:lvl3pPr marL="685800" indent="0">
+              <a:buNone/>
+              <a:defRPr sz="1350" b="1"/>
             </a:lvl3pPr>
-            <a:lvl4pPr marL="1371600" indent="0">
-              <a:buNone/>
-              <a:defRPr sz="1600" b="1"/>
+            <a:lvl4pPr marL="1028700" indent="0">
+              <a:buNone/>
+              <a:defRPr sz="1200" b="1"/>
             </a:lvl4pPr>
-            <a:lvl5pPr marL="1828800" indent="0">
-              <a:buNone/>
-              <a:defRPr sz="1600" b="1"/>
+            <a:lvl5pPr marL="1371600" indent="0">
+              <a:buNone/>
+              <a:defRPr sz="1200" b="1"/>
             </a:lvl5pPr>
-            <a:lvl6pPr marL="2286000" indent="0">
-              <a:buNone/>
-              <a:defRPr sz="1600" b="1"/>
+            <a:lvl6pPr marL="1714500" indent="0">
+              <a:buNone/>
+              <a:defRPr sz="1200" b="1"/>
             </a:lvl6pPr>
-            <a:lvl7pPr marL="2743200" indent="0">
-              <a:buNone/>
-              <a:defRPr sz="1600" b="1"/>
+            <a:lvl7pPr marL="2057400" indent="0">
+              <a:buNone/>
+              <a:defRPr sz="1200" b="1"/>
             </a:lvl7pPr>
-            <a:lvl8pPr marL="3200400" indent="0">
-              <a:buNone/>
-              <a:defRPr sz="1600" b="1"/>
+            <a:lvl8pPr marL="2400300" indent="0">
+              <a:buNone/>
+              <a:defRPr sz="1200" b="1"/>
             </a:lvl8pPr>
-            <a:lvl9pPr marL="3657600" indent="0">
-              <a:buNone/>
-              <a:defRPr sz="1600" b="1"/>
+            <a:lvl9pPr marL="2743200" indent="0">
+              <a:buNone/>
+              <a:defRPr sz="1200" b="1"/>
             </a:lvl9pPr>
           </a:lstStyle>
           <a:p>
             <a:pPr lvl="0"/>
             <a:r>
-              <a:rPr lang="en-US" smtClean="0"/>
+              <a:rPr lang="en-US"/>
               <a:t>Click to edit Master text styles</a:t>
             </a:r>
           </a:p>
@@ -1697,76 +1727,75 @@
         </p:nvSpPr>
         <p:spPr>
           <a:xfrm>
-            <a:off x="4645025" y="2174875"/>
-            <a:ext cx="4041775" cy="3951288"/>
+            <a:off x="4645026" y="1631156"/>
+            <a:ext cx="4041775" cy="2963466"/>
           </a:xfrm>
         </p:spPr>
         <p:txBody>
           <a:bodyPr/>
           <a:lstStyle>
             <a:lvl1pPr>
-              <a:defRPr sz="2400"/>
+              <a:defRPr sz="1800"/>
             </a:lvl1pPr>
             <a:lvl2pPr>
-              <a:defRPr sz="2000"/>
+              <a:defRPr sz="1500"/>
             </a:lvl2pPr>
             <a:lvl3pPr>
-              <a:defRPr sz="1800"/>
+              <a:defRPr sz="1350"/>
             </a:lvl3pPr>
             <a:lvl4pPr>
-              <a:defRPr sz="1600"/>
+              <a:defRPr sz="1200"/>
             </a:lvl4pPr>
             <a:lvl5pPr>
-              <a:defRPr sz="1600"/>
+              <a:defRPr sz="1200"/>
             </a:lvl5pPr>
             <a:lvl6pPr>
-              <a:defRPr sz="1600"/>
+              <a:defRPr sz="1200"/>
             </a:lvl6pPr>
             <a:lvl7pPr>
-              <a:defRPr sz="1600"/>
+              <a:defRPr sz="1200"/>
             </a:lvl7pPr>
             <a:lvl8pPr>
-              <a:defRPr sz="1600"/>
+              <a:defRPr sz="1200"/>
             </a:lvl8pPr>
             <a:lvl9pPr>
-              <a:defRPr sz="1600"/>
+              <a:defRPr sz="1200"/>
             </a:lvl9pPr>
           </a:lstStyle>
           <a:p>
             <a:pPr lvl="0"/>
             <a:r>
-              <a:rPr lang="en-US" smtClean="0"/>
+              <a:rPr lang="en-US"/>
               <a:t>Click to edit Master text styles</a:t>
             </a:r>
           </a:p>
           <a:p>
             <a:pPr lvl="1"/>
             <a:r>
-              <a:rPr lang="en-US" smtClean="0"/>
+              <a:rPr lang="en-US"/>
               <a:t>Second level</a:t>
             </a:r>
           </a:p>
           <a:p>
             <a:pPr lvl="2"/>
             <a:r>
-              <a:rPr lang="en-US" smtClean="0"/>
+              <a:rPr lang="en-US"/>
               <a:t>Third level</a:t>
             </a:r>
           </a:p>
           <a:p>
             <a:pPr lvl="3"/>
             <a:r>
-              <a:rPr lang="en-US" smtClean="0"/>
+              <a:rPr lang="en-US"/>
               <a:t>Fourth level</a:t>
             </a:r>
           </a:p>
           <a:p>
             <a:pPr lvl="4"/>
             <a:r>
-              <a:rPr lang="en-US" smtClean="0"/>
+              <a:rPr lang="en-US"/>
               <a:t>Fifth level</a:t>
             </a:r>
-            <a:endParaRPr lang="en-US"/>
           </a:p>
         </p:txBody>
       </p:sp>
@@ -1787,7 +1816,7 @@
           <a:p>
             <a:fld id="{241EB5C9-1307-BA42-ABA2-0BC069CD8E7F}" type="datetimeFigureOut">
               <a:rPr lang="en-US" smtClean="0"/>
-              <a:t>4/5/2019</a:t>
+              <a:t>2/20/20</a:t>
             </a:fld>
             <a:endParaRPr lang="en-US"/>
           </a:p>
@@ -1881,10 +1910,9 @@
           <a:lstStyle/>
           <a:p>
             <a:r>
-              <a:rPr lang="en-US" smtClean="0"/>
+              <a:rPr lang="en-US"/>
               <a:t>Click to edit Master title style</a:t>
             </a:r>
-            <a:endParaRPr lang="en-US"/>
           </a:p>
         </p:txBody>
       </p:sp>
@@ -1905,7 +1933,7 @@
           <a:p>
             <a:fld id="{241EB5C9-1307-BA42-ABA2-0BC069CD8E7F}" type="datetimeFigureOut">
               <a:rPr lang="en-US" smtClean="0"/>
-              <a:t>4/5/2019</a:t>
+              <a:t>2/20/20</a:t>
             </a:fld>
             <a:endParaRPr lang="en-US"/>
           </a:p>
@@ -2000,7 +2028,7 @@
           <a:p>
             <a:fld id="{241EB5C9-1307-BA42-ABA2-0BC069CD8E7F}" type="datetimeFigureOut">
               <a:rPr lang="en-US" smtClean="0"/>
-              <a:t>4/5/2019</a:t>
+              <a:t>2/20/20</a:t>
             </a:fld>
             <a:endParaRPr lang="en-US"/>
           </a:p>
@@ -2090,23 +2118,22 @@
         </p:nvSpPr>
         <p:spPr>
           <a:xfrm>
-            <a:off x="457200" y="273050"/>
-            <a:ext cx="3008313" cy="1162050"/>
+            <a:off x="457201" y="204787"/>
+            <a:ext cx="3008313" cy="871538"/>
           </a:xfrm>
         </p:spPr>
         <p:txBody>
           <a:bodyPr anchor="b"/>
           <a:lstStyle>
             <a:lvl1pPr algn="l">
-              <a:defRPr sz="2000" b="1"/>
+              <a:defRPr sz="1500" b="1"/>
             </a:lvl1pPr>
           </a:lstStyle>
           <a:p>
             <a:r>
-              <a:rPr lang="en-US" smtClean="0"/>
+              <a:rPr lang="en-US"/>
               <a:t>Click to edit Master title style</a:t>
             </a:r>
-            <a:endParaRPr lang="en-US"/>
           </a:p>
         </p:txBody>
       </p:sp>
@@ -2122,76 +2149,75 @@
         </p:nvSpPr>
         <p:spPr>
           <a:xfrm>
-            <a:off x="3575050" y="273050"/>
-            <a:ext cx="5111750" cy="5853113"/>
+            <a:off x="3575050" y="204788"/>
+            <a:ext cx="5111750" cy="4389835"/>
           </a:xfrm>
         </p:spPr>
         <p:txBody>
           <a:bodyPr/>
           <a:lstStyle>
             <a:lvl1pPr>
-              <a:defRPr sz="3200"/>
+              <a:defRPr sz="2400"/>
             </a:lvl1pPr>
             <a:lvl2pPr>
-              <a:defRPr sz="2800"/>
+              <a:defRPr sz="2100"/>
             </a:lvl2pPr>
             <a:lvl3pPr>
-              <a:defRPr sz="2400"/>
+              <a:defRPr sz="1800"/>
             </a:lvl3pPr>
             <a:lvl4pPr>
-              <a:defRPr sz="2000"/>
+              <a:defRPr sz="1500"/>
             </a:lvl4pPr>
             <a:lvl5pPr>
-              <a:defRPr sz="2000"/>
+              <a:defRPr sz="1500"/>
             </a:lvl5pPr>
             <a:lvl6pPr>
-              <a:defRPr sz="2000"/>
+              <a:defRPr sz="1500"/>
             </a:lvl6pPr>
             <a:lvl7pPr>
-              <a:defRPr sz="2000"/>
+              <a:defRPr sz="1500"/>
             </a:lvl7pPr>
             <a:lvl8pPr>
-              <a:defRPr sz="2000"/>
+              <a:defRPr sz="1500"/>
             </a:lvl8pPr>
             <a:lvl9pPr>
-              <a:defRPr sz="2000"/>
+              <a:defRPr sz="1500"/>
             </a:lvl9pPr>
           </a:lstStyle>
           <a:p>
             <a:pPr lvl="0"/>
             <a:r>
-              <a:rPr lang="en-US" smtClean="0"/>
+              <a:rPr lang="en-US"/>
               <a:t>Click to edit Master text styles</a:t>
             </a:r>
           </a:p>
           <a:p>
             <a:pPr lvl="1"/>
             <a:r>
-              <a:rPr lang="en-US" smtClean="0"/>
+              <a:rPr lang="en-US"/>
               <a:t>Second level</a:t>
             </a:r>
           </a:p>
           <a:p>
             <a:pPr lvl="2"/>
             <a:r>
-              <a:rPr lang="en-US" smtClean="0"/>
+              <a:rPr lang="en-US"/>
               <a:t>Third level</a:t>
             </a:r>
           </a:p>
           <a:p>
             <a:pPr lvl="3"/>
             <a:r>
-              <a:rPr lang="en-US" smtClean="0"/>
+              <a:rPr lang="en-US"/>
               <a:t>Fourth level</a:t>
             </a:r>
           </a:p>
           <a:p>
             <a:pPr lvl="4"/>
             <a:r>
-              <a:rPr lang="en-US" smtClean="0"/>
+              <a:rPr lang="en-US"/>
               <a:t>Fifth level</a:t>
             </a:r>
-            <a:endParaRPr lang="en-US"/>
           </a:p>
         </p:txBody>
       </p:sp>
@@ -2207,8 +2233,8 @@
         </p:nvSpPr>
         <p:spPr>
           <a:xfrm>
-            <a:off x="457200" y="1435100"/>
-            <a:ext cx="3008313" cy="4691063"/>
+            <a:off x="457201" y="1076326"/>
+            <a:ext cx="3008313" cy="3518297"/>
           </a:xfrm>
         </p:spPr>
         <p:txBody>
@@ -2216,45 +2242,45 @@
           <a:lstStyle>
             <a:lvl1pPr marL="0" indent="0">
               <a:buNone/>
-              <a:defRPr sz="1400"/>
+              <a:defRPr sz="1050"/>
             </a:lvl1pPr>
-            <a:lvl2pPr marL="457200" indent="0">
-              <a:buNone/>
-              <a:defRPr sz="1200"/>
+            <a:lvl2pPr marL="342900" indent="0">
+              <a:buNone/>
+              <a:defRPr sz="900"/>
             </a:lvl2pPr>
-            <a:lvl3pPr marL="914400" indent="0">
-              <a:buNone/>
-              <a:defRPr sz="1000"/>
+            <a:lvl3pPr marL="685800" indent="0">
+              <a:buNone/>
+              <a:defRPr sz="750"/>
             </a:lvl3pPr>
-            <a:lvl4pPr marL="1371600" indent="0">
-              <a:buNone/>
-              <a:defRPr sz="900"/>
+            <a:lvl4pPr marL="1028700" indent="0">
+              <a:buNone/>
+              <a:defRPr sz="675"/>
             </a:lvl4pPr>
-            <a:lvl5pPr marL="1828800" indent="0">
-              <a:buNone/>
-              <a:defRPr sz="900"/>
+            <a:lvl5pPr marL="1371600" indent="0">
+              <a:buNone/>
+              <a:defRPr sz="675"/>
             </a:lvl5pPr>
-            <a:lvl6pPr marL="2286000" indent="0">
-              <a:buNone/>
-              <a:defRPr sz="900"/>
+            <a:lvl6pPr marL="1714500" indent="0">
+              <a:buNone/>
+              <a:defRPr sz="675"/>
             </a:lvl6pPr>
-            <a:lvl7pPr marL="2743200" indent="0">
-              <a:buNone/>
-              <a:defRPr sz="900"/>
+            <a:lvl7pPr marL="2057400" indent="0">
+              <a:buNone/>
+              <a:defRPr sz="675"/>
             </a:lvl7pPr>
-            <a:lvl8pPr marL="3200400" indent="0">
-              <a:buNone/>
-              <a:defRPr sz="900"/>
+            <a:lvl8pPr marL="2400300" indent="0">
+              <a:buNone/>
+              <a:defRPr sz="675"/>
             </a:lvl8pPr>
-            <a:lvl9pPr marL="3657600" indent="0">
-              <a:buNone/>
-              <a:defRPr sz="900"/>
+            <a:lvl9pPr marL="2743200" indent="0">
+              <a:buNone/>
+              <a:defRPr sz="675"/>
             </a:lvl9pPr>
           </a:lstStyle>
           <a:p>
             <a:pPr lvl="0"/>
             <a:r>
-              <a:rPr lang="en-US" smtClean="0"/>
+              <a:rPr lang="en-US"/>
               <a:t>Click to edit Master text styles</a:t>
             </a:r>
           </a:p>
@@ -2277,7 +2303,7 @@
           <a:p>
             <a:fld id="{241EB5C9-1307-BA42-ABA2-0BC069CD8E7F}" type="datetimeFigureOut">
               <a:rPr lang="en-US" smtClean="0"/>
-              <a:t>4/5/2019</a:t>
+              <a:t>2/20/20</a:t>
             </a:fld>
             <a:endParaRPr lang="en-US"/>
           </a:p>
@@ -2367,23 +2393,22 @@
         </p:nvSpPr>
         <p:spPr>
           <a:xfrm>
-            <a:off x="1792288" y="4800600"/>
-            <a:ext cx="5486400" cy="566738"/>
+            <a:off x="1792288" y="3600450"/>
+            <a:ext cx="5486400" cy="425054"/>
           </a:xfrm>
         </p:spPr>
         <p:txBody>
           <a:bodyPr anchor="b"/>
           <a:lstStyle>
             <a:lvl1pPr algn="l">
-              <a:defRPr sz="2000" b="1"/>
+              <a:defRPr sz="1500" b="1"/>
             </a:lvl1pPr>
           </a:lstStyle>
           <a:p>
             <a:r>
-              <a:rPr lang="en-US" smtClean="0"/>
+              <a:rPr lang="en-US"/>
               <a:t>Click to edit Master title style</a:t>
             </a:r>
-            <a:endParaRPr lang="en-US"/>
           </a:p>
         </p:txBody>
       </p:sp>
@@ -2399,8 +2424,8 @@
         </p:nvSpPr>
         <p:spPr>
           <a:xfrm>
-            <a:off x="1792288" y="612775"/>
-            <a:ext cx="5486400" cy="4114800"/>
+            <a:off x="1792288" y="459581"/>
+            <a:ext cx="5486400" cy="3086100"/>
           </a:xfrm>
         </p:spPr>
         <p:txBody>
@@ -2408,39 +2433,39 @@
           <a:lstStyle>
             <a:lvl1pPr marL="0" indent="0">
               <a:buNone/>
-              <a:defRPr sz="3200"/>
+              <a:defRPr sz="2400"/>
             </a:lvl1pPr>
-            <a:lvl2pPr marL="457200" indent="0">
-              <a:buNone/>
-              <a:defRPr sz="2800"/>
+            <a:lvl2pPr marL="342900" indent="0">
+              <a:buNone/>
+              <a:defRPr sz="2100"/>
             </a:lvl2pPr>
-            <a:lvl3pPr marL="914400" indent="0">
-              <a:buNone/>
-              <a:defRPr sz="2400"/>
+            <a:lvl3pPr marL="685800" indent="0">
+              <a:buNone/>
+              <a:defRPr sz="1800"/>
             </a:lvl3pPr>
-            <a:lvl4pPr marL="1371600" indent="0">
-              <a:buNone/>
-              <a:defRPr sz="2000"/>
+            <a:lvl4pPr marL="1028700" indent="0">
+              <a:buNone/>
+              <a:defRPr sz="1500"/>
             </a:lvl4pPr>
-            <a:lvl5pPr marL="1828800" indent="0">
-              <a:buNone/>
-              <a:defRPr sz="2000"/>
+            <a:lvl5pPr marL="1371600" indent="0">
+              <a:buNone/>
+              <a:defRPr sz="1500"/>
             </a:lvl5pPr>
-            <a:lvl6pPr marL="2286000" indent="0">
-              <a:buNone/>
-              <a:defRPr sz="2000"/>
+            <a:lvl6pPr marL="1714500" indent="0">
+              <a:buNone/>
+              <a:defRPr sz="1500"/>
             </a:lvl6pPr>
-            <a:lvl7pPr marL="2743200" indent="0">
-              <a:buNone/>
-              <a:defRPr sz="2000"/>
+            <a:lvl7pPr marL="2057400" indent="0">
+              <a:buNone/>
+              <a:defRPr sz="1500"/>
             </a:lvl7pPr>
-            <a:lvl8pPr marL="3200400" indent="0">
-              <a:buNone/>
-              <a:defRPr sz="2000"/>
+            <a:lvl8pPr marL="2400300" indent="0">
+              <a:buNone/>
+              <a:defRPr sz="1500"/>
             </a:lvl8pPr>
-            <a:lvl9pPr marL="3657600" indent="0">
-              <a:buNone/>
-              <a:defRPr sz="2000"/>
+            <a:lvl9pPr marL="2743200" indent="0">
+              <a:buNone/>
+              <a:defRPr sz="1500"/>
             </a:lvl9pPr>
           </a:lstStyle>
           <a:p>
@@ -2460,8 +2485,8 @@
         </p:nvSpPr>
         <p:spPr>
           <a:xfrm>
-            <a:off x="1792288" y="5367338"/>
-            <a:ext cx="5486400" cy="804862"/>
+            <a:off x="1792288" y="4025503"/>
+            <a:ext cx="5486400" cy="603647"/>
           </a:xfrm>
         </p:spPr>
         <p:txBody>
@@ -2469,45 +2494,45 @@
           <a:lstStyle>
             <a:lvl1pPr marL="0" indent="0">
               <a:buNone/>
-              <a:defRPr sz="1400"/>
+              <a:defRPr sz="1050"/>
             </a:lvl1pPr>
-            <a:lvl2pPr marL="457200" indent="0">
-              <a:buNone/>
-              <a:defRPr sz="1200"/>
+            <a:lvl2pPr marL="342900" indent="0">
+              <a:buNone/>
+              <a:defRPr sz="900"/>
             </a:lvl2pPr>
-            <a:lvl3pPr marL="914400" indent="0">
-              <a:buNone/>
-              <a:defRPr sz="1000"/>
+            <a:lvl3pPr marL="685800" indent="0">
+              <a:buNone/>
+              <a:defRPr sz="750"/>
             </a:lvl3pPr>
-            <a:lvl4pPr marL="1371600" indent="0">
-              <a:buNone/>
-              <a:defRPr sz="900"/>
+            <a:lvl4pPr marL="1028700" indent="0">
+              <a:buNone/>
+              <a:defRPr sz="675"/>
             </a:lvl4pPr>
-            <a:lvl5pPr marL="1828800" indent="0">
-              <a:buNone/>
-              <a:defRPr sz="900"/>
+            <a:lvl5pPr marL="1371600" indent="0">
+              <a:buNone/>
+              <a:defRPr sz="675"/>
             </a:lvl5pPr>
-            <a:lvl6pPr marL="2286000" indent="0">
-              <a:buNone/>
-              <a:defRPr sz="900"/>
+            <a:lvl6pPr marL="1714500" indent="0">
+              <a:buNone/>
+              <a:defRPr sz="675"/>
             </a:lvl6pPr>
-            <a:lvl7pPr marL="2743200" indent="0">
-              <a:buNone/>
-              <a:defRPr sz="900"/>
+            <a:lvl7pPr marL="2057400" indent="0">
+              <a:buNone/>
+              <a:defRPr sz="675"/>
             </a:lvl7pPr>
-            <a:lvl8pPr marL="3200400" indent="0">
-              <a:buNone/>
-              <a:defRPr sz="900"/>
+            <a:lvl8pPr marL="2400300" indent="0">
+              <a:buNone/>
+              <a:defRPr sz="675"/>
             </a:lvl8pPr>
-            <a:lvl9pPr marL="3657600" indent="0">
-              <a:buNone/>
-              <a:defRPr sz="900"/>
+            <a:lvl9pPr marL="2743200" indent="0">
+              <a:buNone/>
+              <a:defRPr sz="675"/>
             </a:lvl9pPr>
           </a:lstStyle>
           <a:p>
             <a:pPr lvl="0"/>
             <a:r>
-              <a:rPr lang="en-US" smtClean="0"/>
+              <a:rPr lang="en-US"/>
               <a:t>Click to edit Master text styles</a:t>
             </a:r>
           </a:p>
@@ -2530,7 +2555,7 @@
           <a:p>
             <a:fld id="{241EB5C9-1307-BA42-ABA2-0BC069CD8E7F}" type="datetimeFigureOut">
               <a:rPr lang="en-US" smtClean="0"/>
-              <a:t>4/5/2019</a:t>
+              <a:t>2/20/20</a:t>
             </a:fld>
             <a:endParaRPr lang="en-US"/>
           </a:p>
@@ -2625,8 +2650,8 @@
         </p:nvSpPr>
         <p:spPr>
           <a:xfrm>
-            <a:off x="457200" y="274638"/>
-            <a:ext cx="8229600" cy="1143000"/>
+            <a:off x="457200" y="205979"/>
+            <a:ext cx="8229600" cy="857250"/>
           </a:xfrm>
           <a:prstGeom prst="rect">
             <a:avLst/>
@@ -2639,10 +2664,9 @@
           <a:lstStyle/>
           <a:p>
             <a:r>
-              <a:rPr lang="en-US" smtClean="0"/>
+              <a:rPr lang="en-US"/>
               <a:t>Click to edit Master title style</a:t>
             </a:r>
-            <a:endParaRPr lang="en-US"/>
           </a:p>
         </p:txBody>
       </p:sp>
@@ -2658,8 +2682,8 @@
         </p:nvSpPr>
         <p:spPr>
           <a:xfrm>
-            <a:off x="457200" y="1600200"/>
-            <a:ext cx="8229600" cy="4525963"/>
+            <a:off x="457200" y="1200151"/>
+            <a:ext cx="8229600" cy="3394472"/>
           </a:xfrm>
           <a:prstGeom prst="rect">
             <a:avLst/>
@@ -2673,38 +2697,37 @@
           <a:p>
             <a:pPr lvl="0"/>
             <a:r>
-              <a:rPr lang="en-US" smtClean="0"/>
+              <a:rPr lang="en-US"/>
               <a:t>Click to edit Master text styles</a:t>
             </a:r>
           </a:p>
           <a:p>
             <a:pPr lvl="1"/>
             <a:r>
-              <a:rPr lang="en-US" smtClean="0"/>
+              <a:rPr lang="en-US"/>
               <a:t>Second level</a:t>
             </a:r>
           </a:p>
           <a:p>
             <a:pPr lvl="2"/>
             <a:r>
-              <a:rPr lang="en-US" smtClean="0"/>
+              <a:rPr lang="en-US"/>
               <a:t>Third level</a:t>
             </a:r>
           </a:p>
           <a:p>
             <a:pPr lvl="3"/>
             <a:r>
-              <a:rPr lang="en-US" smtClean="0"/>
+              <a:rPr lang="en-US"/>
               <a:t>Fourth level</a:t>
             </a:r>
           </a:p>
           <a:p>
             <a:pPr lvl="4"/>
             <a:r>
-              <a:rPr lang="en-US" smtClean="0"/>
+              <a:rPr lang="en-US"/>
               <a:t>Fifth level</a:t>
             </a:r>
-            <a:endParaRPr lang="en-US"/>
           </a:p>
         </p:txBody>
       </p:sp>
@@ -2720,8 +2743,8 @@
         </p:nvSpPr>
         <p:spPr>
           <a:xfrm>
-            <a:off x="457200" y="6356350"/>
-            <a:ext cx="2133600" cy="365125"/>
+            <a:off x="457200" y="4767263"/>
+            <a:ext cx="2133600" cy="273844"/>
           </a:xfrm>
           <a:prstGeom prst="rect">
             <a:avLst/>
@@ -2731,7 +2754,7 @@
           <a:bodyPr vert="horz" lIns="91440" tIns="45720" rIns="91440" bIns="45720" rtlCol="0" anchor="ctr"/>
           <a:lstStyle>
             <a:lvl1pPr algn="l">
-              <a:defRPr sz="1200">
+              <a:defRPr sz="900">
                 <a:solidFill>
                   <a:schemeClr val="tx1">
                     <a:tint val="75000"/>
@@ -2743,7 +2766,7 @@
           <a:p>
             <a:fld id="{241EB5C9-1307-BA42-ABA2-0BC069CD8E7F}" type="datetimeFigureOut">
               <a:rPr lang="en-US" smtClean="0"/>
-              <a:t>4/5/2019</a:t>
+              <a:t>2/20/20</a:t>
             </a:fld>
             <a:endParaRPr lang="en-US"/>
           </a:p>
@@ -2761,8 +2784,8 @@
         </p:nvSpPr>
         <p:spPr>
           <a:xfrm>
-            <a:off x="3124200" y="6356350"/>
-            <a:ext cx="2895600" cy="365125"/>
+            <a:off x="3124200" y="4767263"/>
+            <a:ext cx="2895600" cy="273844"/>
           </a:xfrm>
           <a:prstGeom prst="rect">
             <a:avLst/>
@@ -2772,7 +2795,7 @@
           <a:bodyPr vert="horz" lIns="91440" tIns="45720" rIns="91440" bIns="45720" rtlCol="0" anchor="ctr"/>
           <a:lstStyle>
             <a:lvl1pPr algn="ctr">
-              <a:defRPr sz="1200">
+              <a:defRPr sz="900">
                 <a:solidFill>
                   <a:schemeClr val="tx1">
                     <a:tint val="75000"/>
@@ -2798,8 +2821,8 @@
         </p:nvSpPr>
         <p:spPr>
           <a:xfrm>
-            <a:off x="6553200" y="6356350"/>
-            <a:ext cx="2133600" cy="365125"/>
+            <a:off x="6553200" y="4767263"/>
+            <a:ext cx="2133600" cy="273844"/>
           </a:xfrm>
           <a:prstGeom prst="rect">
             <a:avLst/>
@@ -2809,7 +2832,7 @@
           <a:bodyPr vert="horz" lIns="91440" tIns="45720" rIns="91440" bIns="45720" rtlCol="0" anchor="ctr"/>
           <a:lstStyle>
             <a:lvl1pPr algn="r">
-              <a:defRPr sz="1200">
+              <a:defRPr sz="900">
                 <a:solidFill>
                   <a:schemeClr val="tx1">
                     <a:tint val="75000"/>
@@ -2850,12 +2873,12 @@
   </p:sldLayoutIdLst>
   <p:txStyles>
     <p:titleStyle>
-      <a:lvl1pPr algn="ctr" defTabSz="457200" rtl="0" eaLnBrk="1" latinLnBrk="0" hangingPunct="1">
+      <a:lvl1pPr algn="ctr" defTabSz="342900" rtl="0" eaLnBrk="1" latinLnBrk="0" hangingPunct="1">
         <a:spcBef>
           <a:spcPct val="0"/>
         </a:spcBef>
         <a:buNone/>
-        <a:defRPr sz="4400" kern="1200">
+        <a:defRPr sz="3300" kern="1200">
           <a:solidFill>
             <a:schemeClr val="tx1"/>
           </a:solidFill>
@@ -2866,37 +2889,7 @@
       </a:lvl1pPr>
     </p:titleStyle>
     <p:bodyStyle>
-      <a:lvl1pPr marL="342900" indent="-342900" algn="l" defTabSz="457200" rtl="0" eaLnBrk="1" latinLnBrk="0" hangingPunct="1">
-        <a:spcBef>
-          <a:spcPct val="20000"/>
-        </a:spcBef>
-        <a:buFont typeface="Arial"/>
-        <a:buChar char="•"/>
-        <a:defRPr sz="3200" kern="1200">
-          <a:solidFill>
-            <a:schemeClr val="tx1"/>
-          </a:solidFill>
-          <a:latin typeface="+mn-lt"/>
-          <a:ea typeface="+mn-ea"/>
-          <a:cs typeface="+mn-cs"/>
-        </a:defRPr>
-      </a:lvl1pPr>
-      <a:lvl2pPr marL="742950" indent="-285750" algn="l" defTabSz="457200" rtl="0" eaLnBrk="1" latinLnBrk="0" hangingPunct="1">
-        <a:spcBef>
-          <a:spcPct val="20000"/>
-        </a:spcBef>
-        <a:buFont typeface="Arial"/>
-        <a:buChar char="–"/>
-        <a:defRPr sz="2800" kern="1200">
-          <a:solidFill>
-            <a:schemeClr val="tx1"/>
-          </a:solidFill>
-          <a:latin typeface="+mn-lt"/>
-          <a:ea typeface="+mn-ea"/>
-          <a:cs typeface="+mn-cs"/>
-        </a:defRPr>
-      </a:lvl2pPr>
-      <a:lvl3pPr marL="1143000" indent="-228600" algn="l" defTabSz="457200" rtl="0" eaLnBrk="1" latinLnBrk="0" hangingPunct="1">
+      <a:lvl1pPr marL="257175" indent="-257175" algn="l" defTabSz="342900" rtl="0" eaLnBrk="1" latinLnBrk="0" hangingPunct="1">
         <a:spcBef>
           <a:spcPct val="20000"/>
         </a:spcBef>
@@ -2910,14 +2903,44 @@
           <a:ea typeface="+mn-ea"/>
           <a:cs typeface="+mn-cs"/>
         </a:defRPr>
-      </a:lvl3pPr>
-      <a:lvl4pPr marL="1600200" indent="-228600" algn="l" defTabSz="457200" rtl="0" eaLnBrk="1" latinLnBrk="0" hangingPunct="1">
+      </a:lvl1pPr>
+      <a:lvl2pPr marL="557213" indent="-214313" algn="l" defTabSz="342900" rtl="0" eaLnBrk="1" latinLnBrk="0" hangingPunct="1">
         <a:spcBef>
           <a:spcPct val="20000"/>
         </a:spcBef>
         <a:buFont typeface="Arial"/>
         <a:buChar char="–"/>
-        <a:defRPr sz="2000" kern="1200">
+        <a:defRPr sz="2100" kern="1200">
+          <a:solidFill>
+            <a:schemeClr val="tx1"/>
+          </a:solidFill>
+          <a:latin typeface="+mn-lt"/>
+          <a:ea typeface="+mn-ea"/>
+          <a:cs typeface="+mn-cs"/>
+        </a:defRPr>
+      </a:lvl2pPr>
+      <a:lvl3pPr marL="857250" indent="-171450" algn="l" defTabSz="342900" rtl="0" eaLnBrk="1" latinLnBrk="0" hangingPunct="1">
+        <a:spcBef>
+          <a:spcPct val="20000"/>
+        </a:spcBef>
+        <a:buFont typeface="Arial"/>
+        <a:buChar char="•"/>
+        <a:defRPr sz="1800" kern="1200">
+          <a:solidFill>
+            <a:schemeClr val="tx1"/>
+          </a:solidFill>
+          <a:latin typeface="+mn-lt"/>
+          <a:ea typeface="+mn-ea"/>
+          <a:cs typeface="+mn-cs"/>
+        </a:defRPr>
+      </a:lvl3pPr>
+      <a:lvl4pPr marL="1200150" indent="-171450" algn="l" defTabSz="342900" rtl="0" eaLnBrk="1" latinLnBrk="0" hangingPunct="1">
+        <a:spcBef>
+          <a:spcPct val="20000"/>
+        </a:spcBef>
+        <a:buFont typeface="Arial"/>
+        <a:buChar char="–"/>
+        <a:defRPr sz="1500" kern="1200">
           <a:solidFill>
             <a:schemeClr val="tx1"/>
           </a:solidFill>
@@ -2926,13 +2949,13 @@
           <a:cs typeface="+mn-cs"/>
         </a:defRPr>
       </a:lvl4pPr>
-      <a:lvl5pPr marL="2057400" indent="-228600" algn="l" defTabSz="457200" rtl="0" eaLnBrk="1" latinLnBrk="0" hangingPunct="1">
+      <a:lvl5pPr marL="1543050" indent="-171450" algn="l" defTabSz="342900" rtl="0" eaLnBrk="1" latinLnBrk="0" hangingPunct="1">
         <a:spcBef>
           <a:spcPct val="20000"/>
         </a:spcBef>
         <a:buFont typeface="Arial"/>
         <a:buChar char="»"/>
-        <a:defRPr sz="2000" kern="1200">
+        <a:defRPr sz="1500" kern="1200">
           <a:solidFill>
             <a:schemeClr val="tx1"/>
           </a:solidFill>
@@ -2941,13 +2964,13 @@
           <a:cs typeface="+mn-cs"/>
         </a:defRPr>
       </a:lvl5pPr>
-      <a:lvl6pPr marL="2514600" indent="-228600" algn="l" defTabSz="457200" rtl="0" eaLnBrk="1" latinLnBrk="0" hangingPunct="1">
+      <a:lvl6pPr marL="1885950" indent="-171450" algn="l" defTabSz="342900" rtl="0" eaLnBrk="1" latinLnBrk="0" hangingPunct="1">
         <a:spcBef>
           <a:spcPct val="20000"/>
         </a:spcBef>
         <a:buFont typeface="Arial"/>
         <a:buChar char="•"/>
-        <a:defRPr sz="2000" kern="1200">
+        <a:defRPr sz="1500" kern="1200">
           <a:solidFill>
             <a:schemeClr val="tx1"/>
           </a:solidFill>
@@ -2956,13 +2979,13 @@
           <a:cs typeface="+mn-cs"/>
         </a:defRPr>
       </a:lvl6pPr>
-      <a:lvl7pPr marL="2971800" indent="-228600" algn="l" defTabSz="457200" rtl="0" eaLnBrk="1" latinLnBrk="0" hangingPunct="1">
+      <a:lvl7pPr marL="2228850" indent="-171450" algn="l" defTabSz="342900" rtl="0" eaLnBrk="1" latinLnBrk="0" hangingPunct="1">
         <a:spcBef>
           <a:spcPct val="20000"/>
         </a:spcBef>
         <a:buFont typeface="Arial"/>
         <a:buChar char="•"/>
-        <a:defRPr sz="2000" kern="1200">
+        <a:defRPr sz="1500" kern="1200">
           <a:solidFill>
             <a:schemeClr val="tx1"/>
           </a:solidFill>
@@ -2971,13 +2994,13 @@
           <a:cs typeface="+mn-cs"/>
         </a:defRPr>
       </a:lvl7pPr>
-      <a:lvl8pPr marL="3429000" indent="-228600" algn="l" defTabSz="457200" rtl="0" eaLnBrk="1" latinLnBrk="0" hangingPunct="1">
+      <a:lvl8pPr marL="2571750" indent="-171450" algn="l" defTabSz="342900" rtl="0" eaLnBrk="1" latinLnBrk="0" hangingPunct="1">
         <a:spcBef>
           <a:spcPct val="20000"/>
         </a:spcBef>
         <a:buFont typeface="Arial"/>
         <a:buChar char="•"/>
-        <a:defRPr sz="2000" kern="1200">
+        <a:defRPr sz="1500" kern="1200">
           <a:solidFill>
             <a:schemeClr val="tx1"/>
           </a:solidFill>
@@ -2986,13 +3009,13 @@
           <a:cs typeface="+mn-cs"/>
         </a:defRPr>
       </a:lvl8pPr>
-      <a:lvl9pPr marL="3886200" indent="-228600" algn="l" defTabSz="457200" rtl="0" eaLnBrk="1" latinLnBrk="0" hangingPunct="1">
+      <a:lvl9pPr marL="2914650" indent="-171450" algn="l" defTabSz="342900" rtl="0" eaLnBrk="1" latinLnBrk="0" hangingPunct="1">
         <a:spcBef>
           <a:spcPct val="20000"/>
         </a:spcBef>
         <a:buFont typeface="Arial"/>
         <a:buChar char="•"/>
-        <a:defRPr sz="2000" kern="1200">
+        <a:defRPr sz="1500" kern="1200">
           <a:solidFill>
             <a:schemeClr val="tx1"/>
           </a:solidFill>
@@ -3006,8 +3029,8 @@
       <a:defPPr>
         <a:defRPr lang="en-US"/>
       </a:defPPr>
-      <a:lvl1pPr marL="0" algn="l" defTabSz="457200" rtl="0" eaLnBrk="1" latinLnBrk="0" hangingPunct="1">
-        <a:defRPr sz="1800" kern="1200">
+      <a:lvl1pPr marL="0" algn="l" defTabSz="342900" rtl="0" eaLnBrk="1" latinLnBrk="0" hangingPunct="1">
+        <a:defRPr sz="1350" kern="1200">
           <a:solidFill>
             <a:schemeClr val="tx1"/>
           </a:solidFill>
@@ -3016,8 +3039,8 @@
           <a:cs typeface="+mn-cs"/>
         </a:defRPr>
       </a:lvl1pPr>
-      <a:lvl2pPr marL="457200" algn="l" defTabSz="457200" rtl="0" eaLnBrk="1" latinLnBrk="0" hangingPunct="1">
-        <a:defRPr sz="1800" kern="1200">
+      <a:lvl2pPr marL="342900" algn="l" defTabSz="342900" rtl="0" eaLnBrk="1" latinLnBrk="0" hangingPunct="1">
+        <a:defRPr sz="1350" kern="1200">
           <a:solidFill>
             <a:schemeClr val="tx1"/>
           </a:solidFill>
@@ -3026,8 +3049,8 @@
           <a:cs typeface="+mn-cs"/>
         </a:defRPr>
       </a:lvl2pPr>
-      <a:lvl3pPr marL="914400" algn="l" defTabSz="457200" rtl="0" eaLnBrk="1" latinLnBrk="0" hangingPunct="1">
-        <a:defRPr sz="1800" kern="1200">
+      <a:lvl3pPr marL="685800" algn="l" defTabSz="342900" rtl="0" eaLnBrk="1" latinLnBrk="0" hangingPunct="1">
+        <a:defRPr sz="1350" kern="1200">
           <a:solidFill>
             <a:schemeClr val="tx1"/>
           </a:solidFill>
@@ -3036,8 +3059,8 @@
           <a:cs typeface="+mn-cs"/>
         </a:defRPr>
       </a:lvl3pPr>
-      <a:lvl4pPr marL="1371600" algn="l" defTabSz="457200" rtl="0" eaLnBrk="1" latinLnBrk="0" hangingPunct="1">
-        <a:defRPr sz="1800" kern="1200">
+      <a:lvl4pPr marL="1028700" algn="l" defTabSz="342900" rtl="0" eaLnBrk="1" latinLnBrk="0" hangingPunct="1">
+        <a:defRPr sz="1350" kern="1200">
           <a:solidFill>
             <a:schemeClr val="tx1"/>
           </a:solidFill>
@@ -3046,8 +3069,8 @@
           <a:cs typeface="+mn-cs"/>
         </a:defRPr>
       </a:lvl4pPr>
-      <a:lvl5pPr marL="1828800" algn="l" defTabSz="457200" rtl="0" eaLnBrk="1" latinLnBrk="0" hangingPunct="1">
-        <a:defRPr sz="1800" kern="1200">
+      <a:lvl5pPr marL="1371600" algn="l" defTabSz="342900" rtl="0" eaLnBrk="1" latinLnBrk="0" hangingPunct="1">
+        <a:defRPr sz="1350" kern="1200">
           <a:solidFill>
             <a:schemeClr val="tx1"/>
           </a:solidFill>
@@ -3056,8 +3079,8 @@
           <a:cs typeface="+mn-cs"/>
         </a:defRPr>
       </a:lvl5pPr>
-      <a:lvl6pPr marL="2286000" algn="l" defTabSz="457200" rtl="0" eaLnBrk="1" latinLnBrk="0" hangingPunct="1">
-        <a:defRPr sz="1800" kern="1200">
+      <a:lvl6pPr marL="1714500" algn="l" defTabSz="342900" rtl="0" eaLnBrk="1" latinLnBrk="0" hangingPunct="1">
+        <a:defRPr sz="1350" kern="1200">
           <a:solidFill>
             <a:schemeClr val="tx1"/>
           </a:solidFill>
@@ -3066,8 +3089,8 @@
           <a:cs typeface="+mn-cs"/>
         </a:defRPr>
       </a:lvl6pPr>
-      <a:lvl7pPr marL="2743200" algn="l" defTabSz="457200" rtl="0" eaLnBrk="1" latinLnBrk="0" hangingPunct="1">
-        <a:defRPr sz="1800" kern="1200">
+      <a:lvl7pPr marL="2057400" algn="l" defTabSz="342900" rtl="0" eaLnBrk="1" latinLnBrk="0" hangingPunct="1">
+        <a:defRPr sz="1350" kern="1200">
           <a:solidFill>
             <a:schemeClr val="tx1"/>
           </a:solidFill>
@@ -3076,8 +3099,8 @@
           <a:cs typeface="+mn-cs"/>
         </a:defRPr>
       </a:lvl7pPr>
-      <a:lvl8pPr marL="3200400" algn="l" defTabSz="457200" rtl="0" eaLnBrk="1" latinLnBrk="0" hangingPunct="1">
-        <a:defRPr sz="1800" kern="1200">
+      <a:lvl8pPr marL="2400300" algn="l" defTabSz="342900" rtl="0" eaLnBrk="1" latinLnBrk="0" hangingPunct="1">
+        <a:defRPr sz="1350" kern="1200">
           <a:solidFill>
             <a:schemeClr val="tx1"/>
           </a:solidFill>
@@ -3086,8 +3109,8 @@
           <a:cs typeface="+mn-cs"/>
         </a:defRPr>
       </a:lvl8pPr>
-      <a:lvl9pPr marL="3657600" algn="l" defTabSz="457200" rtl="0" eaLnBrk="1" latinLnBrk="0" hangingPunct="1">
-        <a:defRPr sz="1800" kern="1200">
+      <a:lvl9pPr marL="2743200" algn="l" defTabSz="342900" rtl="0" eaLnBrk="1" latinLnBrk="0" hangingPunct="1">
+        <a:defRPr sz="1350" kern="1200">
           <a:solidFill>
             <a:schemeClr val="tx1"/>
           </a:solidFill>
@@ -3130,8 +3153,8 @@
         </p:nvSpPr>
         <p:spPr>
           <a:xfrm>
-            <a:off x="685800" y="2130425"/>
-            <a:ext cx="7772400" cy="1470025"/>
+            <a:off x="685800" y="1597819"/>
+            <a:ext cx="7772400" cy="1102519"/>
           </a:xfrm>
         </p:spPr>
         <p:txBody>
@@ -3208,8 +3231,8 @@
         </p:nvSpPr>
         <p:spPr>
           <a:xfrm>
-            <a:off x="1371600" y="3886200"/>
-            <a:ext cx="6400800" cy="1752600"/>
+            <a:off x="6626351" y="2880360"/>
+            <a:ext cx="2133600" cy="1238794"/>
           </a:xfrm>
         </p:spPr>
         <p:txBody>
@@ -3461,7 +3484,7 @@
               <a:rPr>
                 <a:latin typeface="Courier"/>
               </a:rPr>
-              <a:t>## [1] "Thu Feb 20 13:15:35 2020"</a:t>
+              <a:t>## [1] "Thu Feb 20 13:36:57 2020"</a:t>
             </a:r>
           </a:p>
         </p:txBody>
@@ -3613,7 +3636,7 @@
             <a:pPr lvl="1"/>
             <a:r>
               <a:rPr/>
-              <a:t>Al espacio IPv4 dispoonible se le debe adicionar el recuperado menos el equivalente de un /15 (Reserva de infraestructura crítica):</a:t>
+              <a:t>Al espacio IPv4 disponible se le debe adicionar el recuperado menos el equivalente de un /15 (Reserva de infraestructura crítica):</a:t>
             </a:r>
           </a:p>
           <a:p>
@@ -3716,8 +3739,8 @@
         </p:blipFill>
         <p:spPr bwMode="auto">
           <a:xfrm>
-            <a:off x="1752600" y="1600200"/>
-            <a:ext cx="5651500" cy="4521200"/>
+            <a:off x="2451100" y="1193800"/>
+            <a:ext cx="4241800" cy="3390900"/>
           </a:xfrm>
           <a:prstGeom prst="rect">
             <a:avLst/>
@@ -3817,8 +3840,8 @@
         </p:blipFill>
         <p:spPr bwMode="auto">
           <a:xfrm>
-            <a:off x="1752600" y="1600200"/>
-            <a:ext cx="5651500" cy="4521200"/>
+            <a:off x="2451100" y="1193800"/>
+            <a:ext cx="4241800" cy="3390900"/>
           </a:xfrm>
           <a:prstGeom prst="rect">
             <a:avLst/>
@@ -3918,8 +3941,8 @@
         </p:blipFill>
         <p:spPr bwMode="auto">
           <a:xfrm>
-            <a:off x="1752600" y="1600200"/>
-            <a:ext cx="5651500" cy="4521200"/>
+            <a:off x="2451100" y="1193800"/>
+            <a:ext cx="4241800" cy="3390900"/>
           </a:xfrm>
           <a:prstGeom prst="rect">
             <a:avLst/>

</xml_diff>

<commit_message>
mejora en los textos de los slides
</commit_message>
<xml_diff>
--- a/lacnic-ipv4-fase3-model/LACNIC_IPv4_F3_Report_v3.pptx
+++ b/lacnic-ipv4-fase3-model/LACNIC_IPv4_F3_Report_v3.pptx
@@ -13,6 +13,7 @@
     <p:sldId id="261" r:id="rId7"/>
     <p:sldId id="262" r:id="rId8"/>
     <p:sldId id="263" r:id="rId9"/>
+    <p:sldId id="264" r:id="rId10"/>
   </p:sldIdLst>
   <p:sldSz cx="9144000" cy="5143500" type="screen16x9"/>
   <p:notesSz cx="6858000" cy="9144000"/>
@@ -3344,7 +3345,7 @@
               <a:rPr>
                 <a:hlinkClick r:id="rId4" action="ppaction://hlinksldjump"/>
               </a:rPr>
-              <a:t>Modelo de grado 1</a:t>
+              <a:t>Predicciones de agotamiento</a:t>
             </a:r>
           </a:p>
           <a:p>
@@ -3353,7 +3354,7 @@
               <a:rPr>
                 <a:hlinkClick r:id="rId5" action="ppaction://hlinksldjump"/>
               </a:rPr>
-              <a:t>Modelo de grado 2</a:t>
+              <a:t>Modelo de grado 1</a:t>
             </a:r>
           </a:p>
           <a:p>
@@ -3362,7 +3363,7 @@
               <a:rPr>
                 <a:hlinkClick r:id="rId6" action="ppaction://hlinksldjump"/>
               </a:rPr>
-              <a:t>Modelo de grado 3</a:t>
+              <a:t>Modelo de grado 2</a:t>
             </a:r>
           </a:p>
           <a:p>
@@ -3370,6 +3371,15 @@
             <a:r>
               <a:rPr>
                 <a:hlinkClick r:id="rId7" action="ppaction://hlinksldjump"/>
+              </a:rPr>
+              <a:t>Modelo de grado 3</a:t>
+            </a:r>
+          </a:p>
+          <a:p>
+            <a:pPr lvl="1"/>
+            <a:r>
+              <a:rPr>
+                <a:hlinkClick r:id="rId8" action="ppaction://hlinksldjump"/>
               </a:rPr>
               <a:t>Fechas de agotamiento</a:t>
             </a:r>
@@ -3484,7 +3494,7 @@
               <a:rPr>
                 <a:latin typeface="Courier"/>
               </a:rPr>
-              <a:t>## [1] "Thu Feb 20 13:36:57 2020"</a:t>
+              <a:t>## [1] "Thu Feb 20 16:49:13 2020"</a:t>
             </a:r>
           </a:p>
         </p:txBody>
@@ -3694,7 +3704,7 @@
             </a:pPr>
             <a:r>
               <a:rPr/>
-              <a:t>Modelo</a:t>
+              <a:t>Predicciones</a:t>
             </a:r>
             <a:r>
               <a:rPr/>
@@ -3710,49 +3720,41 @@
             </a:r>
             <a:r>
               <a:rPr/>
-              <a:t>grado</a:t>
-            </a:r>
-            <a:r>
-              <a:rPr/>
-              <a:t> </a:t>
-            </a:r>
-            <a:r>
-              <a:rPr/>
-              <a:t>1</a:t>
-            </a:r>
-          </a:p>
-        </p:txBody>
-      </p:sp>
-      <p:pic>
-        <p:nvPicPr>
-          <p:cNvPr descr="LACNIC_IPv4_F3_Report_v3_files/figure-pptx/unnamed-chunk-3-1.png" id="0" name="Picture 1"/>
-          <p:cNvPicPr>
-            <a:picLocks noGrp="1" noChangeAspect="1"/>
-          </p:cNvPicPr>
-          <p:nvPr/>
-        </p:nvPicPr>
-        <p:blipFill>
-          <a:blip r:embed="rId2"/>
-          <a:stretch>
-            <a:fillRect/>
-          </a:stretch>
-        </p:blipFill>
-        <p:spPr bwMode="auto">
-          <a:xfrm>
-            <a:off x="2451100" y="1193800"/>
-            <a:ext cx="4241800" cy="3390900"/>
-          </a:xfrm>
-          <a:prstGeom prst="rect">
-            <a:avLst/>
-          </a:prstGeom>
-          <a:noFill/>
-          <a:ln w="9525">
-            <a:noFill/>
-            <a:headEnd/>
-            <a:tailEnd/>
-          </a:ln>
-        </p:spPr>
-      </p:pic>
+              <a:t>agotamiento</a:t>
+            </a:r>
+          </a:p>
+        </p:txBody>
+      </p:sp>
+      <p:sp>
+        <p:nvSpPr>
+          <p:cNvPr id="3" name="Content Placeholder 2"/>
+          <p:cNvSpPr>
+            <a:spLocks noGrp="1"/>
+          </p:cNvSpPr>
+          <p:nvPr>
+            <p:ph idx="1"/>
+          </p:nvPr>
+        </p:nvSpPr>
+        <p:spPr/>
+        <p:txBody>
+          <a:bodyPr/>
+          <a:lstStyle/>
+          <a:p>
+            <a:pPr lvl="1"/>
+            <a:r>
+              <a:rPr/>
+              <a:t>Se realizan tres ajustes por mínimos cuadrados (grados 1, 2 y 3)</a:t>
+            </a:r>
+          </a:p>
+          <a:p>
+            <a:pPr lvl="1"/>
+            <a:r>
+              <a:rPr i="1"/>
+              <a:t>Observación: los modelos de grado mayor a uno pueden no converger</a:t>
+            </a:r>
+          </a:p>
+        </p:txBody>
+      </p:sp>
     </p:spTree>
   </p:cSld>
 </p:sld>
@@ -3819,14 +3821,14 @@
             </a:r>
             <a:r>
               <a:rPr/>
-              <a:t>2</a:t>
+              <a:t>1</a:t>
             </a:r>
           </a:p>
         </p:txBody>
       </p:sp>
       <p:pic>
         <p:nvPicPr>
-          <p:cNvPr descr="LACNIC_IPv4_F3_Report_v3_files/figure-pptx/unnamed-chunk-4-1.png" id="0" name="Picture 1"/>
+          <p:cNvPr descr="LACNIC_IPv4_F3_Report_v3_files/figure-pptx/unnamed-chunk-3-1.png" id="0" name="Picture 1"/>
           <p:cNvPicPr>
             <a:picLocks noGrp="1" noChangeAspect="1"/>
           </p:cNvPicPr>
@@ -3920,6 +3922,107 @@
             </a:r>
             <a:r>
               <a:rPr/>
+              <a:t>2</a:t>
+            </a:r>
+          </a:p>
+        </p:txBody>
+      </p:sp>
+      <p:pic>
+        <p:nvPicPr>
+          <p:cNvPr descr="LACNIC_IPv4_F3_Report_v3_files/figure-pptx/unnamed-chunk-4-1.png" id="0" name="Picture 1"/>
+          <p:cNvPicPr>
+            <a:picLocks noGrp="1" noChangeAspect="1"/>
+          </p:cNvPicPr>
+          <p:nvPr/>
+        </p:nvPicPr>
+        <p:blipFill>
+          <a:blip r:embed="rId2"/>
+          <a:stretch>
+            <a:fillRect/>
+          </a:stretch>
+        </p:blipFill>
+        <p:spPr bwMode="auto">
+          <a:xfrm>
+            <a:off x="2451100" y="1193800"/>
+            <a:ext cx="4241800" cy="3390900"/>
+          </a:xfrm>
+          <a:prstGeom prst="rect">
+            <a:avLst/>
+          </a:prstGeom>
+          <a:noFill/>
+          <a:ln w="9525">
+            <a:noFill/>
+            <a:headEnd/>
+            <a:tailEnd/>
+          </a:ln>
+        </p:spPr>
+      </p:pic>
+    </p:spTree>
+  </p:cSld>
+</p:sld>
+</file>
+
+<file path=ppt/slides/slide8.xml><?xml version="1.0" encoding="utf-8"?>
+<p:sld xmlns:a="http://schemas.openxmlformats.org/drawingml/2006/main" xmlns:r="http://schemas.openxmlformats.org/officeDocument/2006/relationships" xmlns:p="http://schemas.openxmlformats.org/presentationml/2006/main">
+  <p:cSld>
+    <p:spTree>
+      <p:nvGrpSpPr>
+        <p:cNvPr id="1" name=""/>
+        <p:cNvGrpSpPr/>
+        <p:nvPr/>
+      </p:nvGrpSpPr>
+      <p:grpSpPr>
+        <a:xfrm>
+          <a:off x="0" y="0"/>
+          <a:ext cx="0" cy="0"/>
+          <a:chOff x="0" y="0"/>
+          <a:chExt cx="0" cy="0"/>
+        </a:xfrm>
+      </p:grpSpPr>
+      <p:sp>
+        <p:nvSpPr>
+          <p:cNvPr id="2" name="Title 1"/>
+          <p:cNvSpPr>
+            <a:spLocks noGrp="1"/>
+          </p:cNvSpPr>
+          <p:nvPr>
+            <p:ph type="title"/>
+          </p:nvPr>
+        </p:nvSpPr>
+        <p:spPr/>
+        <p:txBody>
+          <a:bodyPr/>
+          <a:lstStyle/>
+          <a:p>
+            <a:pPr lvl="0" marL="0" indent="0">
+              <a:buNone/>
+            </a:pPr>
+            <a:r>
+              <a:rPr/>
+              <a:t>Modelo</a:t>
+            </a:r>
+            <a:r>
+              <a:rPr/>
+              <a:t> </a:t>
+            </a:r>
+            <a:r>
+              <a:rPr/>
+              <a:t>de</a:t>
+            </a:r>
+            <a:r>
+              <a:rPr/>
+              <a:t> </a:t>
+            </a:r>
+            <a:r>
+              <a:rPr/>
+              <a:t>grado</a:t>
+            </a:r>
+            <a:r>
+              <a:rPr/>
+              <a:t> </a:t>
+            </a:r>
+            <a:r>
+              <a:rPr/>
               <a:t>3</a:t>
             </a:r>
           </a:p>
@@ -3960,7 +4063,7 @@
 </p:sld>
 </file>
 
-<file path=ppt/slides/slide8.xml><?xml version="1.0" encoding="utf-8"?>
+<file path=ppt/slides/slide9.xml><?xml version="1.0" encoding="utf-8"?>
 <p:sld xmlns:a="http://schemas.openxmlformats.org/drawingml/2006/main" xmlns:r="http://schemas.openxmlformats.org/officeDocument/2006/relationships" xmlns:p="http://schemas.openxmlformats.org/presentationml/2006/main">
   <p:cSld>
     <p:spTree>

</xml_diff>

<commit_message>
Agregado una proyeccion con la serie "smoothed".
</commit_message>
<xml_diff>
--- a/lacnic-ipv4-fase3-model/LACNIC_IPv4_F3_Report_v3.pptx
+++ b/lacnic-ipv4-fase3-model/LACNIC_IPv4_F3_Report_v3.pptx
@@ -332,7 +332,7 @@
           <a:p>
             <a:fld id="{241EB5C9-1307-BA42-ABA2-0BC069CD8E7F}" type="datetimeFigureOut">
               <a:rPr lang="en-US" smtClean="0"/>
-              <a:t>2/21/20</a:t>
+              <a:t>2/20/20</a:t>
             </a:fld>
             <a:endParaRPr lang="en-US"/>
           </a:p>
@@ -500,7 +500,7 @@
           <a:p>
             <a:fld id="{241EB5C9-1307-BA42-ABA2-0BC069CD8E7F}" type="datetimeFigureOut">
               <a:rPr lang="en-US" smtClean="0"/>
-              <a:t>2/21/20</a:t>
+              <a:t>2/20/20</a:t>
             </a:fld>
             <a:endParaRPr lang="en-US"/>
           </a:p>
@@ -678,7 +678,7 @@
           <a:p>
             <a:fld id="{241EB5C9-1307-BA42-ABA2-0BC069CD8E7F}" type="datetimeFigureOut">
               <a:rPr lang="en-US" smtClean="0"/>
-              <a:t>2/21/20</a:t>
+              <a:t>2/20/20</a:t>
             </a:fld>
             <a:endParaRPr lang="en-US"/>
           </a:p>
@@ -1113,7 +1113,7 @@
           <a:p>
             <a:fld id="{241EB5C9-1307-BA42-ABA2-0BC069CD8E7F}" type="datetimeFigureOut">
               <a:rPr lang="en-US" smtClean="0"/>
-              <a:t>2/21/20</a:t>
+              <a:t>2/20/20</a:t>
             </a:fld>
             <a:endParaRPr lang="en-US"/>
           </a:p>
@@ -1398,7 +1398,7 @@
           <a:p>
             <a:fld id="{241EB5C9-1307-BA42-ABA2-0BC069CD8E7F}" type="datetimeFigureOut">
               <a:rPr lang="en-US" smtClean="0"/>
-              <a:t>2/21/20</a:t>
+              <a:t>2/20/20</a:t>
             </a:fld>
             <a:endParaRPr lang="en-US"/>
           </a:p>
@@ -1817,7 +1817,7 @@
           <a:p>
             <a:fld id="{241EB5C9-1307-BA42-ABA2-0BC069CD8E7F}" type="datetimeFigureOut">
               <a:rPr lang="en-US" smtClean="0"/>
-              <a:t>2/21/20</a:t>
+              <a:t>2/20/20</a:t>
             </a:fld>
             <a:endParaRPr lang="en-US"/>
           </a:p>
@@ -1934,7 +1934,7 @@
           <a:p>
             <a:fld id="{241EB5C9-1307-BA42-ABA2-0BC069CD8E7F}" type="datetimeFigureOut">
               <a:rPr lang="en-US" smtClean="0"/>
-              <a:t>2/21/20</a:t>
+              <a:t>2/20/20</a:t>
             </a:fld>
             <a:endParaRPr lang="en-US"/>
           </a:p>
@@ -2029,7 +2029,7 @@
           <a:p>
             <a:fld id="{241EB5C9-1307-BA42-ABA2-0BC069CD8E7F}" type="datetimeFigureOut">
               <a:rPr lang="en-US" smtClean="0"/>
-              <a:t>2/21/20</a:t>
+              <a:t>2/20/20</a:t>
             </a:fld>
             <a:endParaRPr lang="en-US"/>
           </a:p>
@@ -2304,7 +2304,7 @@
           <a:p>
             <a:fld id="{241EB5C9-1307-BA42-ABA2-0BC069CD8E7F}" type="datetimeFigureOut">
               <a:rPr lang="en-US" smtClean="0"/>
-              <a:t>2/21/20</a:t>
+              <a:t>2/20/20</a:t>
             </a:fld>
             <a:endParaRPr lang="en-US"/>
           </a:p>
@@ -2556,7 +2556,7 @@
           <a:p>
             <a:fld id="{241EB5C9-1307-BA42-ABA2-0BC069CD8E7F}" type="datetimeFigureOut">
               <a:rPr lang="en-US" smtClean="0"/>
-              <a:t>2/21/20</a:t>
+              <a:t>2/20/20</a:t>
             </a:fld>
             <a:endParaRPr lang="en-US"/>
           </a:p>
@@ -2767,7 +2767,7 @@
           <a:p>
             <a:fld id="{241EB5C9-1307-BA42-ABA2-0BC069CD8E7F}" type="datetimeFigureOut">
               <a:rPr lang="en-US" smtClean="0"/>
-              <a:t>2/21/20</a:t>
+              <a:t>2/20/20</a:t>
             </a:fld>
             <a:endParaRPr lang="en-US"/>
           </a:p>
@@ -3162,11 +3162,60 @@
           <a:bodyPr/>
           <a:lstStyle/>
           <a:p>
-            <a:pPr marL="0" lvl="0" indent="0">
+            <a:pPr lvl="0" marL="0" indent="0">
               <a:buNone/>
             </a:pPr>
             <a:r>
-              <a:t>Reporte de fase 3 de agotamiento IPv4</a:t>
+              <a:rPr/>
+              <a:t>Reporte</a:t>
+            </a:r>
+            <a:r>
+              <a:rPr/>
+              <a:t> </a:t>
+            </a:r>
+            <a:r>
+              <a:rPr/>
+              <a:t>de</a:t>
+            </a:r>
+            <a:r>
+              <a:rPr/>
+              <a:t> </a:t>
+            </a:r>
+            <a:r>
+              <a:rPr/>
+              <a:t>fase</a:t>
+            </a:r>
+            <a:r>
+              <a:rPr/>
+              <a:t> </a:t>
+            </a:r>
+            <a:r>
+              <a:rPr/>
+              <a:t>3</a:t>
+            </a:r>
+            <a:r>
+              <a:rPr/>
+              <a:t> </a:t>
+            </a:r>
+            <a:r>
+              <a:rPr/>
+              <a:t>de</a:t>
+            </a:r>
+            <a:r>
+              <a:rPr/>
+              <a:t> </a:t>
+            </a:r>
+            <a:r>
+              <a:rPr/>
+              <a:t>agotamiento</a:t>
+            </a:r>
+            <a:r>
+              <a:rPr/>
+              <a:t> </a:t>
+            </a:r>
+            <a:r>
+              <a:rPr/>
+              <a:t>IPv4</a:t>
             </a:r>
           </a:p>
         </p:txBody>
@@ -3191,22 +3240,28 @@
           <a:bodyPr/>
           <a:lstStyle/>
           <a:p>
-            <a:pPr marL="0" lvl="0" indent="0">
+            <a:pPr lvl="0" marL="0" indent="0">
               <a:buNone/>
             </a:pPr>
             <a:br/>
             <a:br/>
             <a:r>
-              <a:t>I+D LACNIC</a:t>
+              <a:rPr/>
+              <a:t>I+D</a:t>
+            </a:r>
+            <a:r>
+              <a:rPr/>
+              <a:t> </a:t>
+            </a:r>
+            <a:r>
+              <a:rPr/>
+              <a:t>LACNIC</a:t>
             </a:r>
           </a:p>
         </p:txBody>
       </p:sp>
     </p:spTree>
   </p:cSld>
-  <p:clrMapOvr>
-    <a:masterClrMapping/>
-  </p:clrMapOvr>
 </p:sld>
 </file>
 
@@ -3242,10 +3297,11 @@
           <a:bodyPr/>
           <a:lstStyle/>
           <a:p>
-            <a:pPr marL="0" lvl="0" indent="0">
+            <a:pPr lvl="0" marL="0" indent="0">
               <a:buNone/>
             </a:pPr>
             <a:r>
+              <a:rPr/>
               <a:t>Table of Contents</a:t>
             </a:r>
           </a:p>
@@ -3330,11 +3386,38 @@
           </a:p>
         </p:txBody>
       </p:sp>
+      <p:pic>
+        <p:nvPicPr>
+          <p:cNvPr id="8" name="Picture 7" descr="A close up of a logo  Description automatically generated">
+            <a:extLst>
+              <a:ext uri="{FF2B5EF4-FFF2-40B4-BE49-F238E27FC236}">
+                <a16:creationId xmlns:a16="http://schemas.microsoft.com/office/drawing/2014/main" id="{BE98634C-9424-C34A-B44C-E6A561AC649A}"/>
+              </a:ext>
+            </a:extLst>
+          </p:cNvPr>
+          <p:cNvPicPr>
+            <a:picLocks noChangeAspect="1"/>
+          </p:cNvPicPr>
+          <p:nvPr userDrawn="1"/>
+        </p:nvPicPr>
+        <p:blipFill>
+          <a:blip r:embed="rId2"/>
+          <a:stretch>
+            <a:fillRect/>
+          </a:stretch>
+        </p:blipFill>
+        <p:spPr>
+          <a:xfrm>
+            <a:off x="282121" y="4628560"/>
+            <a:ext cx="1006748" cy="459775"/>
+          </a:xfrm>
+          <a:prstGeom prst="rect">
+            <a:avLst/>
+          </a:prstGeom>
+        </p:spPr>
+      </p:pic>
     </p:spTree>
   </p:cSld>
-  <p:clrMapOvr>
-    <a:masterClrMapping/>
-  </p:clrMapOvr>
 </p:sld>
 </file>
 
@@ -3370,11 +3453,44 @@
           <a:bodyPr/>
           <a:lstStyle/>
           <a:p>
-            <a:pPr marL="0" lvl="0" indent="0">
+            <a:pPr lvl="0" marL="0" indent="0">
               <a:buNone/>
             </a:pPr>
             <a:r>
-              <a:t>Fecha de generación del reporte</a:t>
+              <a:rPr/>
+              <a:t>Fecha</a:t>
+            </a:r>
+            <a:r>
+              <a:rPr/>
+              <a:t> </a:t>
+            </a:r>
+            <a:r>
+              <a:rPr/>
+              <a:t>de</a:t>
+            </a:r>
+            <a:r>
+              <a:rPr/>
+              <a:t> </a:t>
+            </a:r>
+            <a:r>
+              <a:rPr/>
+              <a:t>generación</a:t>
+            </a:r>
+            <a:r>
+              <a:rPr/>
+              <a:t> </a:t>
+            </a:r>
+            <a:r>
+              <a:rPr/>
+              <a:t>del</a:t>
+            </a:r>
+            <a:r>
+              <a:rPr/>
+              <a:t> </a:t>
+            </a:r>
+            <a:r>
+              <a:rPr/>
+              <a:t>reporte</a:t>
             </a:r>
           </a:p>
         </p:txBody>
@@ -3396,27 +3512,55 @@
           <a:p>
             <a:pPr lvl="1"/>
             <a:r>
+              <a:rPr/>
               <a:t>Fecha de generación de este reporte:</a:t>
             </a:r>
           </a:p>
           <a:p>
-            <a:pPr lvl="0" indent="0">
+            <a:pPr lvl="0" marL="1270000" indent="0">
               <a:buNone/>
             </a:pPr>
             <a:r>
-              <a:rPr>
+              <a:rPr sz="1800">
                 <a:latin typeface="Courier"/>
               </a:rPr>
-              <a:t>## [1] "Fri Feb 21 10:37:06 2020"</a:t>
-            </a:r>
-          </a:p>
-        </p:txBody>
-      </p:sp>
+              <a:t>## [1] "Wed Mar 04 17:01:19 2020"</a:t>
+            </a:r>
+          </a:p>
+        </p:txBody>
+      </p:sp>
+      <p:pic>
+        <p:nvPicPr>
+          <p:cNvPr id="8" name="Picture 7" descr="A close up of a logo  Description automatically generated">
+            <a:extLst>
+              <a:ext uri="{FF2B5EF4-FFF2-40B4-BE49-F238E27FC236}">
+                <a16:creationId xmlns:a16="http://schemas.microsoft.com/office/drawing/2014/main" id="{BE98634C-9424-C34A-B44C-E6A561AC649A}"/>
+              </a:ext>
+            </a:extLst>
+          </p:cNvPr>
+          <p:cNvPicPr>
+            <a:picLocks noChangeAspect="1"/>
+          </p:cNvPicPr>
+          <p:nvPr userDrawn="1"/>
+        </p:nvPicPr>
+        <p:blipFill>
+          <a:blip r:embed="rId2"/>
+          <a:stretch>
+            <a:fillRect/>
+          </a:stretch>
+        </p:blipFill>
+        <p:spPr>
+          <a:xfrm>
+            <a:off x="282121" y="4628560"/>
+            <a:ext cx="1006748" cy="459775"/>
+          </a:xfrm>
+          <a:prstGeom prst="rect">
+            <a:avLst/>
+          </a:prstGeom>
+        </p:spPr>
+      </p:pic>
     </p:spTree>
   </p:cSld>
-  <p:clrMapOvr>
-    <a:masterClrMapping/>
-  </p:clrMapOvr>
 </p:sld>
 </file>
 
@@ -3452,11 +3596,60 @@
           <a:bodyPr/>
           <a:lstStyle/>
           <a:p>
-            <a:pPr marL="0" lvl="0" indent="0">
+            <a:pPr lvl="0" marL="0" indent="0">
               <a:buNone/>
             </a:pPr>
             <a:r>
-              <a:t>Políticas aplicables y fuentes de datos utilizadas</a:t>
+              <a:rPr/>
+              <a:t>Políticas</a:t>
+            </a:r>
+            <a:r>
+              <a:rPr/>
+              <a:t> </a:t>
+            </a:r>
+            <a:r>
+              <a:rPr/>
+              <a:t>aplicables</a:t>
+            </a:r>
+            <a:r>
+              <a:rPr/>
+              <a:t> </a:t>
+            </a:r>
+            <a:r>
+              <a:rPr/>
+              <a:t>y</a:t>
+            </a:r>
+            <a:r>
+              <a:rPr/>
+              <a:t> </a:t>
+            </a:r>
+            <a:r>
+              <a:rPr/>
+              <a:t>fuentes</a:t>
+            </a:r>
+            <a:r>
+              <a:rPr/>
+              <a:t> </a:t>
+            </a:r>
+            <a:r>
+              <a:rPr/>
+              <a:t>de</a:t>
+            </a:r>
+            <a:r>
+              <a:rPr/>
+              <a:t> </a:t>
+            </a:r>
+            <a:r>
+              <a:rPr/>
+              <a:t>datos</a:t>
+            </a:r>
+            <a:r>
+              <a:rPr/>
+              <a:t> </a:t>
+            </a:r>
+            <a:r>
+              <a:rPr/>
+              <a:t>utilizadas</a:t>
             </a:r>
           </a:p>
         </p:txBody>
@@ -3478,6 +3671,7 @@
           <a:p>
             <a:pPr lvl="1"/>
             <a:r>
+              <a:rPr/>
               <a:t>La fase 3 del agotamiento de IPv4 comenzó oficialmente el 15 de febrero de 2017. Información detallada sobre este proceso se puede encontrar en </a:t>
             </a:r>
             <a:r>
@@ -3487,12 +3681,14 @@
               <a:t>http://www.lacnic.net/agotamiento</a:t>
             </a:r>
             <a:r>
+              <a:rPr/>
               <a:t>.</a:t>
             </a:r>
           </a:p>
           <a:p>
             <a:pPr lvl="1"/>
             <a:r>
+              <a:rPr/>
               <a:t>El dataset “IPv4 disponible en LACNIC” se puede descargar de: </a:t>
             </a:r>
             <a:r>
@@ -3502,21 +3698,23 @@
               <a:t>http://opendata.labs.lacnic.net/ipv4stats/ipv4avail/lacnic?lastdays=365</a:t>
             </a:r>
             <a:r>
+              <a:rPr/>
               <a:t>.</a:t>
             </a:r>
           </a:p>
           <a:p>
             <a:pPr lvl="1"/>
             <a:r>
+              <a:rPr/>
               <a:t>Al espacio IPv4 disponible se le debe adicionar el recuperado menos el equivalente de un /15 (Reserva de infraestructura crítica):</a:t>
             </a:r>
           </a:p>
           <a:p>
-            <a:pPr lvl="0" indent="0">
+            <a:pPr lvl="0" marL="1270000" indent="0">
               <a:buNone/>
             </a:pPr>
             <a:r>
-              <a:rPr>
+              <a:rPr sz="1800">
                 <a:latin typeface="Courier"/>
               </a:rPr>
               <a:t>## [1] 1334016</a:t>
@@ -3524,11 +3722,38 @@
           </a:p>
         </p:txBody>
       </p:sp>
+      <p:pic>
+        <p:nvPicPr>
+          <p:cNvPr id="8" name="Picture 7" descr="A close up of a logo  Description automatically generated">
+            <a:extLst>
+              <a:ext uri="{FF2B5EF4-FFF2-40B4-BE49-F238E27FC236}">
+                <a16:creationId xmlns:a16="http://schemas.microsoft.com/office/drawing/2014/main" id="{BE98634C-9424-C34A-B44C-E6A561AC649A}"/>
+              </a:ext>
+            </a:extLst>
+          </p:cNvPr>
+          <p:cNvPicPr>
+            <a:picLocks noChangeAspect="1"/>
+          </p:cNvPicPr>
+          <p:nvPr userDrawn="1"/>
+        </p:nvPicPr>
+        <p:blipFill>
+          <a:blip r:embed="rId2"/>
+          <a:stretch>
+            <a:fillRect/>
+          </a:stretch>
+        </p:blipFill>
+        <p:spPr>
+          <a:xfrm>
+            <a:off x="282121" y="4628560"/>
+            <a:ext cx="1006748" cy="459775"/>
+          </a:xfrm>
+          <a:prstGeom prst="rect">
+            <a:avLst/>
+          </a:prstGeom>
+        </p:spPr>
+      </p:pic>
     </p:spTree>
   </p:cSld>
-  <p:clrMapOvr>
-    <a:masterClrMapping/>
-  </p:clrMapOvr>
 </p:sld>
 </file>
 
@@ -3564,11 +3789,28 @@
           <a:bodyPr/>
           <a:lstStyle/>
           <a:p>
-            <a:pPr marL="0" lvl="0" indent="0">
+            <a:pPr lvl="0" marL="0" indent="0">
               <a:buNone/>
             </a:pPr>
             <a:r>
-              <a:t>Predicciones de agotamiento</a:t>
+              <a:rPr/>
+              <a:t>Predicciones</a:t>
+            </a:r>
+            <a:r>
+              <a:rPr/>
+              <a:t> </a:t>
+            </a:r>
+            <a:r>
+              <a:rPr/>
+              <a:t>de</a:t>
+            </a:r>
+            <a:r>
+              <a:rPr/>
+              <a:t> </a:t>
+            </a:r>
+            <a:r>
+              <a:rPr/>
+              <a:t>agotamiento</a:t>
             </a:r>
           </a:p>
         </p:txBody>
@@ -3590,6 +3832,7 @@
           <a:p>
             <a:pPr lvl="1"/>
             <a:r>
+              <a:rPr/>
               <a:t>Se realizan tres ajustes por mínimos cuadrados (grados 1, 2 y 3)</a:t>
             </a:r>
           </a:p>
@@ -3602,11 +3845,38 @@
           </a:p>
         </p:txBody>
       </p:sp>
+      <p:pic>
+        <p:nvPicPr>
+          <p:cNvPr id="8" name="Picture 7" descr="A close up of a logo  Description automatically generated">
+            <a:extLst>
+              <a:ext uri="{FF2B5EF4-FFF2-40B4-BE49-F238E27FC236}">
+                <a16:creationId xmlns:a16="http://schemas.microsoft.com/office/drawing/2014/main" id="{BE98634C-9424-C34A-B44C-E6A561AC649A}"/>
+              </a:ext>
+            </a:extLst>
+          </p:cNvPr>
+          <p:cNvPicPr>
+            <a:picLocks noChangeAspect="1"/>
+          </p:cNvPicPr>
+          <p:nvPr userDrawn="1"/>
+        </p:nvPicPr>
+        <p:blipFill>
+          <a:blip r:embed="rId2"/>
+          <a:stretch>
+            <a:fillRect/>
+          </a:stretch>
+        </p:blipFill>
+        <p:spPr>
+          <a:xfrm>
+            <a:off x="282121" y="4628560"/>
+            <a:ext cx="1006748" cy="459775"/>
+          </a:xfrm>
+          <a:prstGeom prst="rect">
+            <a:avLst/>
+          </a:prstGeom>
+        </p:spPr>
+      </p:pic>
     </p:spTree>
   </p:cSld>
-  <p:clrMapOvr>
-    <a:masterClrMapping/>
-  </p:clrMapOvr>
 </p:sld>
 </file>
 
@@ -3642,18 +3912,43 @@
           <a:bodyPr/>
           <a:lstStyle/>
           <a:p>
-            <a:pPr marL="0" lvl="0" indent="0">
+            <a:pPr lvl="0" marL="0" indent="0">
               <a:buNone/>
             </a:pPr>
             <a:r>
-              <a:t>Modelo de grado 1</a:t>
+              <a:rPr/>
+              <a:t>Modelo</a:t>
+            </a:r>
+            <a:r>
+              <a:rPr/>
+              <a:t> </a:t>
+            </a:r>
+            <a:r>
+              <a:rPr/>
+              <a:t>de</a:t>
+            </a:r>
+            <a:r>
+              <a:rPr/>
+              <a:t> </a:t>
+            </a:r>
+            <a:r>
+              <a:rPr/>
+              <a:t>grado</a:t>
+            </a:r>
+            <a:r>
+              <a:rPr/>
+              <a:t> </a:t>
+            </a:r>
+            <a:r>
+              <a:rPr/>
+              <a:t>1</a:t>
             </a:r>
           </a:p>
         </p:txBody>
       </p:sp>
       <p:pic>
         <p:nvPicPr>
-          <p:cNvPr id="3" name="Picture 1" descr="LACNIC_IPv4_F3_Report_v3_files/figure-pptx/unnamed-chunk-3-1.png"/>
+          <p:cNvPr descr="LACNIC_IPv4_F3_Report_v3_files/figure-pptx/unnamed-chunk-3-1.png" id="0" name="Picture 1"/>
           <p:cNvPicPr>
             <a:picLocks noGrp="1" noChangeAspect="1"/>
           </p:cNvPicPr>
@@ -3681,11 +3976,38 @@
           </a:ln>
         </p:spPr>
       </p:pic>
+      <p:pic>
+        <p:nvPicPr>
+          <p:cNvPr id="8" name="Picture 7" descr="A close up of a logo  Description automatically generated">
+            <a:extLst>
+              <a:ext uri="{FF2B5EF4-FFF2-40B4-BE49-F238E27FC236}">
+                <a16:creationId xmlns:a16="http://schemas.microsoft.com/office/drawing/2014/main" id="{BE98634C-9424-C34A-B44C-E6A561AC649A}"/>
+              </a:ext>
+            </a:extLst>
+          </p:cNvPr>
+          <p:cNvPicPr>
+            <a:picLocks noChangeAspect="1"/>
+          </p:cNvPicPr>
+          <p:nvPr userDrawn="1"/>
+        </p:nvPicPr>
+        <p:blipFill>
+          <a:blip r:embed="rId2"/>
+          <a:stretch>
+            <a:fillRect/>
+          </a:stretch>
+        </p:blipFill>
+        <p:spPr>
+          <a:xfrm>
+            <a:off x="282121" y="4628560"/>
+            <a:ext cx="1006748" cy="459775"/>
+          </a:xfrm>
+          <a:prstGeom prst="rect">
+            <a:avLst/>
+          </a:prstGeom>
+        </p:spPr>
+      </p:pic>
     </p:spTree>
   </p:cSld>
-  <p:clrMapOvr>
-    <a:masterClrMapping/>
-  </p:clrMapOvr>
 </p:sld>
 </file>
 
@@ -3721,18 +4043,43 @@
           <a:bodyPr/>
           <a:lstStyle/>
           <a:p>
-            <a:pPr marL="0" lvl="0" indent="0">
+            <a:pPr lvl="0" marL="0" indent="0">
               <a:buNone/>
             </a:pPr>
             <a:r>
-              <a:t>Modelo de grado 2</a:t>
+              <a:rPr/>
+              <a:t>Modelo</a:t>
+            </a:r>
+            <a:r>
+              <a:rPr/>
+              <a:t> </a:t>
+            </a:r>
+            <a:r>
+              <a:rPr/>
+              <a:t>de</a:t>
+            </a:r>
+            <a:r>
+              <a:rPr/>
+              <a:t> </a:t>
+            </a:r>
+            <a:r>
+              <a:rPr/>
+              <a:t>grado</a:t>
+            </a:r>
+            <a:r>
+              <a:rPr/>
+              <a:t> </a:t>
+            </a:r>
+            <a:r>
+              <a:rPr/>
+              <a:t>2</a:t>
             </a:r>
           </a:p>
         </p:txBody>
       </p:sp>
       <p:pic>
         <p:nvPicPr>
-          <p:cNvPr id="3" name="Picture 1" descr="LACNIC_IPv4_F3_Report_v3_files/figure-pptx/unnamed-chunk-4-1.png"/>
+          <p:cNvPr descr="LACNIC_IPv4_F3_Report_v3_files/figure-pptx/unnamed-chunk-4-1.png" id="0" name="Picture 1"/>
           <p:cNvPicPr>
             <a:picLocks noGrp="1" noChangeAspect="1"/>
           </p:cNvPicPr>
@@ -3760,11 +4107,38 @@
           </a:ln>
         </p:spPr>
       </p:pic>
+      <p:pic>
+        <p:nvPicPr>
+          <p:cNvPr id="8" name="Picture 7" descr="A close up of a logo  Description automatically generated">
+            <a:extLst>
+              <a:ext uri="{FF2B5EF4-FFF2-40B4-BE49-F238E27FC236}">
+                <a16:creationId xmlns:a16="http://schemas.microsoft.com/office/drawing/2014/main" id="{BE98634C-9424-C34A-B44C-E6A561AC649A}"/>
+              </a:ext>
+            </a:extLst>
+          </p:cNvPr>
+          <p:cNvPicPr>
+            <a:picLocks noChangeAspect="1"/>
+          </p:cNvPicPr>
+          <p:nvPr userDrawn="1"/>
+        </p:nvPicPr>
+        <p:blipFill>
+          <a:blip r:embed="rId2"/>
+          <a:stretch>
+            <a:fillRect/>
+          </a:stretch>
+        </p:blipFill>
+        <p:spPr>
+          <a:xfrm>
+            <a:off x="282121" y="4628560"/>
+            <a:ext cx="1006748" cy="459775"/>
+          </a:xfrm>
+          <a:prstGeom prst="rect">
+            <a:avLst/>
+          </a:prstGeom>
+        </p:spPr>
+      </p:pic>
     </p:spTree>
   </p:cSld>
-  <p:clrMapOvr>
-    <a:masterClrMapping/>
-  </p:clrMapOvr>
 </p:sld>
 </file>
 
@@ -3800,18 +4174,43 @@
           <a:bodyPr/>
           <a:lstStyle/>
           <a:p>
-            <a:pPr marL="0" lvl="0" indent="0">
+            <a:pPr lvl="0" marL="0" indent="0">
               <a:buNone/>
             </a:pPr>
             <a:r>
-              <a:t>Modelo de grado 3</a:t>
+              <a:rPr/>
+              <a:t>Modelo</a:t>
+            </a:r>
+            <a:r>
+              <a:rPr/>
+              <a:t> </a:t>
+            </a:r>
+            <a:r>
+              <a:rPr/>
+              <a:t>de</a:t>
+            </a:r>
+            <a:r>
+              <a:rPr/>
+              <a:t> </a:t>
+            </a:r>
+            <a:r>
+              <a:rPr/>
+              <a:t>grado</a:t>
+            </a:r>
+            <a:r>
+              <a:rPr/>
+              <a:t> </a:t>
+            </a:r>
+            <a:r>
+              <a:rPr/>
+              <a:t>3</a:t>
             </a:r>
           </a:p>
         </p:txBody>
       </p:sp>
       <p:pic>
         <p:nvPicPr>
-          <p:cNvPr id="3" name="Picture 1" descr="LACNIC_IPv4_F3_Report_v3_files/figure-pptx/unnamed-chunk-5-1.png"/>
+          <p:cNvPr descr="LACNIC_IPv4_F3_Report_v3_files/figure-pptx/unnamed-chunk-5-1.png" id="0" name="Picture 1"/>
           <p:cNvPicPr>
             <a:picLocks noGrp="1" noChangeAspect="1"/>
           </p:cNvPicPr>
@@ -3839,11 +4238,38 @@
           </a:ln>
         </p:spPr>
       </p:pic>
+      <p:pic>
+        <p:nvPicPr>
+          <p:cNvPr id="8" name="Picture 7" descr="A close up of a logo  Description automatically generated">
+            <a:extLst>
+              <a:ext uri="{FF2B5EF4-FFF2-40B4-BE49-F238E27FC236}">
+                <a16:creationId xmlns:a16="http://schemas.microsoft.com/office/drawing/2014/main" id="{BE98634C-9424-C34A-B44C-E6A561AC649A}"/>
+              </a:ext>
+            </a:extLst>
+          </p:cNvPr>
+          <p:cNvPicPr>
+            <a:picLocks noChangeAspect="1"/>
+          </p:cNvPicPr>
+          <p:nvPr userDrawn="1"/>
+        </p:nvPicPr>
+        <p:blipFill>
+          <a:blip r:embed="rId2"/>
+          <a:stretch>
+            <a:fillRect/>
+          </a:stretch>
+        </p:blipFill>
+        <p:spPr>
+          <a:xfrm>
+            <a:off x="282121" y="4628560"/>
+            <a:ext cx="1006748" cy="459775"/>
+          </a:xfrm>
+          <a:prstGeom prst="rect">
+            <a:avLst/>
+          </a:prstGeom>
+        </p:spPr>
+      </p:pic>
     </p:spTree>
   </p:cSld>
-  <p:clrMapOvr>
-    <a:masterClrMapping/>
-  </p:clrMapOvr>
 </p:sld>
 </file>
 
@@ -3879,11 +4305,28 @@
           <a:bodyPr/>
           <a:lstStyle/>
           <a:p>
-            <a:pPr marL="0" lvl="0" indent="0">
+            <a:pPr lvl="0" marL="0" indent="0">
               <a:buNone/>
             </a:pPr>
             <a:r>
-              <a:t>Fechas de agotamiento</a:t>
+              <a:rPr/>
+              <a:t>Fechas</a:t>
+            </a:r>
+            <a:r>
+              <a:rPr/>
+              <a:t> </a:t>
+            </a:r>
+            <a:r>
+              <a:rPr/>
+              <a:t>de</a:t>
+            </a:r>
+            <a:r>
+              <a:rPr/>
+              <a:t> </a:t>
+            </a:r>
+            <a:r>
+              <a:rPr/>
+              <a:t>agotamiento</a:t>
             </a:r>
           </a:p>
         </p:txBody>
@@ -3903,42 +4346,45 @@
           <a:bodyPr/>
           <a:lstStyle/>
           <a:p>
-            <a:pPr marL="0" lvl="0" indent="0">
+            <a:pPr lvl="0" marL="0" indent="0">
               <a:buNone/>
             </a:pPr>
             <a:r>
+              <a:rPr/>
               <a:t>La predicción de fechas de agotamiento de acuerdo a los diferentes modelos es:</a:t>
             </a:r>
           </a:p>
           <a:p>
             <a:pPr lvl="1"/>
             <a:r>
+              <a:rPr/>
               <a:t>Grado 1:</a:t>
             </a:r>
           </a:p>
           <a:p>
-            <a:pPr lvl="0" indent="0">
+            <a:pPr lvl="0" marL="1270000" indent="0">
               <a:buNone/>
             </a:pPr>
             <a:r>
-              <a:rPr>
+              <a:rPr sz="1800">
                 <a:latin typeface="Courier"/>
               </a:rPr>
-              <a:t>## [1] "2020-12-31"</a:t>
+              <a:t>## [1] "2021-01-16"</a:t>
             </a:r>
           </a:p>
           <a:p>
             <a:pPr lvl="1"/>
             <a:r>
+              <a:rPr/>
               <a:t>Grado 2:</a:t>
             </a:r>
           </a:p>
           <a:p>
-            <a:pPr lvl="0" indent="0">
+            <a:pPr lvl="0" marL="1270000" indent="0">
               <a:buNone/>
             </a:pPr>
             <a:r>
-              <a:rPr>
+              <a:rPr sz="1800">
                 <a:latin typeface="Courier"/>
               </a:rPr>
               <a:t>## [1] NA</a:t>
@@ -3947,15 +4393,16 @@
           <a:p>
             <a:pPr lvl="1"/>
             <a:r>
+              <a:rPr/>
               <a:t>Grado 3:</a:t>
             </a:r>
           </a:p>
           <a:p>
-            <a:pPr lvl="0" indent="0">
+            <a:pPr lvl="0" marL="1270000" indent="0">
               <a:buNone/>
             </a:pPr>
             <a:r>
-              <a:rPr>
+              <a:rPr sz="1800">
                 <a:latin typeface="Courier"/>
               </a:rPr>
               <a:t>## [1] NA</a:t>
@@ -3963,11 +4410,38 @@
           </a:p>
         </p:txBody>
       </p:sp>
+      <p:pic>
+        <p:nvPicPr>
+          <p:cNvPr id="8" name="Picture 7" descr="A close up of a logo  Description automatically generated">
+            <a:extLst>
+              <a:ext uri="{FF2B5EF4-FFF2-40B4-BE49-F238E27FC236}">
+                <a16:creationId xmlns:a16="http://schemas.microsoft.com/office/drawing/2014/main" id="{BE98634C-9424-C34A-B44C-E6A561AC649A}"/>
+              </a:ext>
+            </a:extLst>
+          </p:cNvPr>
+          <p:cNvPicPr>
+            <a:picLocks noChangeAspect="1"/>
+          </p:cNvPicPr>
+          <p:nvPr userDrawn="1"/>
+        </p:nvPicPr>
+        <p:blipFill>
+          <a:blip r:embed="rId2"/>
+          <a:stretch>
+            <a:fillRect/>
+          </a:stretch>
+        </p:blipFill>
+        <p:spPr>
+          <a:xfrm>
+            <a:off x="282121" y="4628560"/>
+            <a:ext cx="1006748" cy="459775"/>
+          </a:xfrm>
+          <a:prstGeom prst="rect">
+            <a:avLst/>
+          </a:prstGeom>
+        </p:spPr>
+      </p:pic>
     </p:spTree>
   </p:cSld>
-  <p:clrMapOvr>
-    <a:masterClrMapping/>
-  </p:clrMapOvr>
 </p:sld>
 </file>
 

</xml_diff>

<commit_message>
Modelado basado en nuevo set de datos tomado de los archivos de netdata
</commit_message>
<xml_diff>
--- a/lacnic-ipv4-fase3-model/LACNIC_IPv4_F3_Report_v3.pptx
+++ b/lacnic-ipv4-fase3-model/LACNIC_IPv4_F3_Report_v3.pptx
@@ -3524,7 +3524,7 @@
               <a:rPr sz="1800">
                 <a:latin typeface="Courier"/>
               </a:rPr>
-              <a:t>## [1] "Wed Mar 04 17:01:19 2020"</a:t>
+              <a:t>## [1] "Sun Mar 22 12:34:36 2020"</a:t>
             </a:r>
           </a:p>
         </p:txBody>
@@ -3717,7 +3717,7 @@
               <a:rPr sz="1800">
                 <a:latin typeface="Courier"/>
               </a:rPr>
-              <a:t>## [1] 1334016</a:t>
+              <a:t>## [1] 274944</a:t>
             </a:r>
           </a:p>
         </p:txBody>
@@ -4369,7 +4369,7 @@
               <a:rPr sz="1800">
                 <a:latin typeface="Courier"/>
               </a:rPr>
-              <a:t>## [1] "2021-01-16"</a:t>
+              <a:t>## [1] "2021-03-16"</a:t>
             </a:r>
           </a:p>
           <a:p>
@@ -4387,7 +4387,7 @@
               <a:rPr sz="1800">
                 <a:latin typeface="Courier"/>
               </a:rPr>
-              <a:t>## [1] NA</a:t>
+              <a:t>## [1] "2021-01-02"</a:t>
             </a:r>
           </a:p>
           <a:p>
@@ -4405,7 +4405,7 @@
               <a:rPr sz="1800">
                 <a:latin typeface="Courier"/>
               </a:rPr>
-              <a:t>## [1] NA</a:t>
+              <a:t>## [1] "2020-08-27"</a:t>
             </a:r>
           </a:p>
         </p:txBody>

</xml_diff>